<commit_message>
Finished preparation for first class.
</commit_message>
<xml_diff>
--- a/Cours-1/html1.pptx
+++ b/Cours-1/html1.pptx
@@ -46,8 +46,8 @@
     <p:sldId id="290" r:id="rId37"/>
     <p:sldId id="291" r:id="rId38"/>
     <p:sldId id="292" r:id="rId39"/>
-    <p:sldId id="293" r:id="rId40"/>
-    <p:sldId id="294" r:id="rId41"/>
+    <p:sldId id="294" r:id="rId40"/>
+    <p:sldId id="293" r:id="rId41"/>
     <p:sldId id="295" r:id="rId42"/>
     <p:sldId id="296" r:id="rId43"/>
     <p:sldId id="297" r:id="rId44"/>
@@ -4258,7 +4258,7 @@
         <p:spPr>
           <a:xfrm>
             <a:off x="2971800" y="549275"/>
-            <a:ext cx="3657600" cy="2743199"/>
+            <a:ext cx="3657600" cy="2743200"/>
           </a:xfrm>
           <a:custGeom>
             <a:avLst/>
@@ -4359,7 +4359,7 @@
         <p:spPr>
           <a:xfrm>
             <a:off x="2971800" y="549275"/>
-            <a:ext cx="3657600" cy="2743199"/>
+            <a:ext cx="3657600" cy="2743200"/>
           </a:xfrm>
           <a:custGeom>
             <a:avLst/>
@@ -4501,7 +4501,7 @@
   <p:cSld>
     <p:spTree>
       <p:nvGrpSpPr>
-        <p:cNvPr id="1" name="Shape 386"/>
+        <p:cNvPr id="1" name="Shape 392"/>
         <p:cNvGrpSpPr/>
         <p:nvPr/>
       </p:nvGrpSpPr>
@@ -4515,7 +4515,7 @@
       </p:grpSpPr>
       <p:sp>
         <p:nvSpPr>
-          <p:cNvPr id="387" name="Shape 387"/>
+          <p:cNvPr id="393" name="Shape 393"/>
           <p:cNvSpPr txBox="1">
             <a:spLocks noGrp="1"/>
           </p:cNvSpPr>
@@ -4550,7 +4550,7 @@
       </p:sp>
       <p:sp>
         <p:nvSpPr>
-          <p:cNvPr id="388" name="Shape 388"/>
+          <p:cNvPr id="394" name="Shape 394"/>
           <p:cNvSpPr>
             <a:spLocks noGrp="1" noRot="1" noChangeAspect="1"/>
           </p:cNvSpPr>
@@ -4602,7 +4602,7 @@
   <p:cSld>
     <p:spTree>
       <p:nvGrpSpPr>
-        <p:cNvPr id="1" name="Shape 392"/>
+        <p:cNvPr id="1" name="Shape 386"/>
         <p:cNvGrpSpPr/>
         <p:nvPr/>
       </p:nvGrpSpPr>
@@ -4616,7 +4616,7 @@
       </p:grpSpPr>
       <p:sp>
         <p:nvSpPr>
-          <p:cNvPr id="393" name="Shape 393"/>
+          <p:cNvPr id="387" name="Shape 387"/>
           <p:cNvSpPr txBox="1">
             <a:spLocks noGrp="1"/>
           </p:cNvSpPr>
@@ -4651,7 +4651,7 @@
       </p:sp>
       <p:sp>
         <p:nvSpPr>
-          <p:cNvPr id="394" name="Shape 394"/>
+          <p:cNvPr id="388" name="Shape 388"/>
           <p:cNvSpPr>
             <a:spLocks noGrp="1" noRot="1" noChangeAspect="1"/>
           </p:cNvSpPr>
@@ -5141,7 +5141,7 @@
         <p:spPr>
           <a:xfrm>
             <a:off x="2971800" y="549275"/>
-            <a:ext cx="3657600" cy="2743199"/>
+            <a:ext cx="3657600" cy="2743200"/>
           </a:xfrm>
           <a:custGeom>
             <a:avLst/>
@@ -5646,7 +5646,7 @@
         <p:spPr>
           <a:xfrm>
             <a:off x="2971800" y="549275"/>
-            <a:ext cx="3657600" cy="2743199"/>
+            <a:ext cx="3657600" cy="2743200"/>
           </a:xfrm>
           <a:custGeom>
             <a:avLst/>
@@ -37046,7 +37046,7 @@
               <a:buNone/>
             </a:pPr>
             <a:r>
-              <a:rPr lang="en-US" sz="1800" b="0" i="0" u="none">
+              <a:rPr lang="en-US" sz="1800" b="0" i="0" u="none" dirty="0">
                 <a:solidFill>
                   <a:srgbClr val="404040"/>
                 </a:solidFill>
@@ -37055,7 +37055,103 @@
                 <a:cs typeface="Trebuchet MS"/>
                 <a:sym typeface="Trebuchet MS"/>
               </a:rPr>
-              <a:t>Un tableau est composé de lignes, de colonnes et de cellules. </a:t>
+              <a:t>Un tableau </a:t>
+            </a:r>
+            <a:r>
+              <a:rPr lang="en-US" sz="1800" b="0" i="0" u="none" dirty="0" err="1">
+                <a:solidFill>
+                  <a:srgbClr val="404040"/>
+                </a:solidFill>
+                <a:latin typeface="Trebuchet MS"/>
+                <a:ea typeface="Trebuchet MS"/>
+                <a:cs typeface="Trebuchet MS"/>
+                <a:sym typeface="Trebuchet MS"/>
+              </a:rPr>
+              <a:t>est</a:t>
+            </a:r>
+            <a:r>
+              <a:rPr lang="en-US" sz="1800" b="0" i="0" u="none" dirty="0">
+                <a:solidFill>
+                  <a:srgbClr val="404040"/>
+                </a:solidFill>
+                <a:latin typeface="Trebuchet MS"/>
+                <a:ea typeface="Trebuchet MS"/>
+                <a:cs typeface="Trebuchet MS"/>
+                <a:sym typeface="Trebuchet MS"/>
+              </a:rPr>
+              <a:t> </a:t>
+            </a:r>
+            <a:r>
+              <a:rPr lang="en-US" sz="1800" b="0" i="0" u="none" dirty="0" err="1">
+                <a:solidFill>
+                  <a:srgbClr val="404040"/>
+                </a:solidFill>
+                <a:latin typeface="Trebuchet MS"/>
+                <a:ea typeface="Trebuchet MS"/>
+                <a:cs typeface="Trebuchet MS"/>
+                <a:sym typeface="Trebuchet MS"/>
+              </a:rPr>
+              <a:t>composé</a:t>
+            </a:r>
+            <a:r>
+              <a:rPr lang="en-US" sz="1800" b="0" i="0" u="none" dirty="0">
+                <a:solidFill>
+                  <a:srgbClr val="404040"/>
+                </a:solidFill>
+                <a:latin typeface="Trebuchet MS"/>
+                <a:ea typeface="Trebuchet MS"/>
+                <a:cs typeface="Trebuchet MS"/>
+                <a:sym typeface="Trebuchet MS"/>
+              </a:rPr>
+              <a:t> de </a:t>
+            </a:r>
+            <a:r>
+              <a:rPr lang="en-US" sz="1800" b="0" i="0" u="none" dirty="0" err="1">
+                <a:solidFill>
+                  <a:srgbClr val="404040"/>
+                </a:solidFill>
+                <a:latin typeface="Trebuchet MS"/>
+                <a:ea typeface="Trebuchet MS"/>
+                <a:cs typeface="Trebuchet MS"/>
+                <a:sym typeface="Trebuchet MS"/>
+              </a:rPr>
+              <a:t>lignes</a:t>
+            </a:r>
+            <a:r>
+              <a:rPr lang="en-US" sz="1800" b="0" i="0" u="none" dirty="0">
+                <a:solidFill>
+                  <a:srgbClr val="404040"/>
+                </a:solidFill>
+                <a:latin typeface="Trebuchet MS"/>
+                <a:ea typeface="Trebuchet MS"/>
+                <a:cs typeface="Trebuchet MS"/>
+                <a:sym typeface="Trebuchet MS"/>
+              </a:rPr>
+              <a:t>, de </a:t>
+            </a:r>
+            <a:r>
+              <a:rPr lang="en-US" sz="1800" b="0" i="0" u="none" dirty="0" err="1">
+                <a:solidFill>
+                  <a:srgbClr val="404040"/>
+                </a:solidFill>
+                <a:latin typeface="Trebuchet MS"/>
+                <a:ea typeface="Trebuchet MS"/>
+                <a:cs typeface="Trebuchet MS"/>
+                <a:sym typeface="Trebuchet MS"/>
+              </a:rPr>
+              <a:t>colonnes</a:t>
+            </a:r>
+            <a:r>
+              <a:rPr lang="en-US" sz="1800" b="0" i="0" u="none" dirty="0">
+                <a:solidFill>
+                  <a:srgbClr val="404040"/>
+                </a:solidFill>
+                <a:latin typeface="Trebuchet MS"/>
+                <a:ea typeface="Trebuchet MS"/>
+                <a:cs typeface="Trebuchet MS"/>
+                <a:sym typeface="Trebuchet MS"/>
+              </a:rPr>
+              <a:t> et de cellules. </a:t>
             </a:r>
           </a:p>
           <a:p>
@@ -37076,7 +37172,7 @@
               <a:buFont typeface="Trebuchet MS"/>
             </a:pPr>
             <a:r>
-              <a:rPr lang="en-US" sz="1800" b="0" i="0" u="none">
+              <a:rPr lang="en-US" sz="1800" b="0" i="0" u="none" dirty="0">
                 <a:solidFill>
                   <a:srgbClr val="404040"/>
                 </a:solidFill>
@@ -37085,7 +37181,79 @@
                 <a:cs typeface="Trebuchet MS"/>
                 <a:sym typeface="Trebuchet MS"/>
               </a:rPr>
-              <a:t>&lt;table&gt; Définit la table. Attributs: width, height, border, cellspacing, style.</a:t>
+              <a:t>&lt;table&gt; </a:t>
+            </a:r>
+            <a:r>
+              <a:rPr lang="en-US" sz="1800" b="0" i="0" u="none" dirty="0" err="1">
+                <a:solidFill>
+                  <a:srgbClr val="404040"/>
+                </a:solidFill>
+                <a:latin typeface="Trebuchet MS"/>
+                <a:ea typeface="Trebuchet MS"/>
+                <a:cs typeface="Trebuchet MS"/>
+                <a:sym typeface="Trebuchet MS"/>
+              </a:rPr>
+              <a:t>Définit</a:t>
+            </a:r>
+            <a:r>
+              <a:rPr lang="en-US" sz="1800" b="0" i="0" u="none" dirty="0">
+                <a:solidFill>
+                  <a:srgbClr val="404040"/>
+                </a:solidFill>
+                <a:latin typeface="Trebuchet MS"/>
+                <a:ea typeface="Trebuchet MS"/>
+                <a:cs typeface="Trebuchet MS"/>
+                <a:sym typeface="Trebuchet MS"/>
+              </a:rPr>
+              <a:t> la table. </a:t>
+            </a:r>
+            <a:r>
+              <a:rPr lang="en-US" sz="1800" b="0" i="0" u="none" dirty="0" err="1">
+                <a:solidFill>
+                  <a:srgbClr val="404040"/>
+                </a:solidFill>
+                <a:latin typeface="Trebuchet MS"/>
+                <a:ea typeface="Trebuchet MS"/>
+                <a:cs typeface="Trebuchet MS"/>
+                <a:sym typeface="Trebuchet MS"/>
+              </a:rPr>
+              <a:t>Attributs</a:t>
+            </a:r>
+            <a:r>
+              <a:rPr lang="en-US" sz="1800" b="0" i="0" u="none" dirty="0">
+                <a:solidFill>
+                  <a:srgbClr val="404040"/>
+                </a:solidFill>
+                <a:latin typeface="Trebuchet MS"/>
+                <a:ea typeface="Trebuchet MS"/>
+                <a:cs typeface="Trebuchet MS"/>
+                <a:sym typeface="Trebuchet MS"/>
+              </a:rPr>
+              <a:t>: width, height, border, </a:t>
+            </a:r>
+            <a:r>
+              <a:rPr lang="en-US" sz="1800" b="0" i="0" u="none" dirty="0" err="1">
+                <a:solidFill>
+                  <a:srgbClr val="404040"/>
+                </a:solidFill>
+                <a:latin typeface="Trebuchet MS"/>
+                <a:ea typeface="Trebuchet MS"/>
+                <a:cs typeface="Trebuchet MS"/>
+                <a:sym typeface="Trebuchet MS"/>
+              </a:rPr>
+              <a:t>cellspacing</a:t>
+            </a:r>
+            <a:r>
+              <a:rPr lang="en-US" sz="1800" b="0" i="0" u="none" dirty="0">
+                <a:solidFill>
+                  <a:srgbClr val="404040"/>
+                </a:solidFill>
+                <a:latin typeface="Trebuchet MS"/>
+                <a:ea typeface="Trebuchet MS"/>
+                <a:cs typeface="Trebuchet MS"/>
+                <a:sym typeface="Trebuchet MS"/>
+              </a:rPr>
+              <a:t>, style.</a:t>
             </a:r>
           </a:p>
           <a:p>
@@ -37106,7 +37274,7 @@
               <a:buFont typeface="Trebuchet MS"/>
             </a:pPr>
             <a:r>
-              <a:rPr lang="en-US" sz="1800" b="0" i="0" u="none">
+              <a:rPr lang="en-US" sz="1800" b="0" i="0" u="none" dirty="0">
                 <a:solidFill>
                   <a:srgbClr val="404040"/>
                 </a:solidFill>
@@ -37115,7 +37283,55 @@
                 <a:cs typeface="Trebuchet MS"/>
                 <a:sym typeface="Trebuchet MS"/>
               </a:rPr>
-              <a:t>&lt;tr&gt; (lignes)</a:t>
+              <a:t>&lt;</a:t>
+            </a:r>
+            <a:r>
+              <a:rPr lang="en-US" sz="1800" b="0" i="0" u="none" dirty="0" err="1">
+                <a:solidFill>
+                  <a:srgbClr val="404040"/>
+                </a:solidFill>
+                <a:latin typeface="Trebuchet MS"/>
+                <a:ea typeface="Trebuchet MS"/>
+                <a:cs typeface="Trebuchet MS"/>
+                <a:sym typeface="Trebuchet MS"/>
+              </a:rPr>
+              <a:t>tr</a:t>
+            </a:r>
+            <a:r>
+              <a:rPr lang="en-US" sz="1800" b="0" i="0" u="none" dirty="0">
+                <a:solidFill>
+                  <a:srgbClr val="404040"/>
+                </a:solidFill>
+                <a:latin typeface="Trebuchet MS"/>
+                <a:ea typeface="Trebuchet MS"/>
+                <a:cs typeface="Trebuchet MS"/>
+                <a:sym typeface="Trebuchet MS"/>
+              </a:rPr>
+              <a:t>&gt; (</a:t>
+            </a:r>
+            <a:r>
+              <a:rPr lang="en-US" sz="1800" b="0" i="0" u="none" dirty="0" err="1">
+                <a:solidFill>
+                  <a:srgbClr val="404040"/>
+                </a:solidFill>
+                <a:latin typeface="Trebuchet MS"/>
+                <a:ea typeface="Trebuchet MS"/>
+                <a:cs typeface="Trebuchet MS"/>
+                <a:sym typeface="Trebuchet MS"/>
+              </a:rPr>
+              <a:t>lignes</a:t>
+            </a:r>
+            <a:r>
+              <a:rPr lang="en-US" sz="1800" b="0" i="0" u="none" dirty="0" smtClean="0">
+                <a:solidFill>
+                  <a:srgbClr val="404040"/>
+                </a:solidFill>
+                <a:latin typeface="Trebuchet MS"/>
+                <a:ea typeface="Trebuchet MS"/>
+                <a:cs typeface="Trebuchet MS"/>
+                <a:sym typeface="Trebuchet MS"/>
+              </a:rPr>
+              <a:t>)</a:t>
             </a:r>
           </a:p>
           <a:p>
@@ -37136,7 +37352,50 @@
               <a:buFont typeface="Trebuchet MS"/>
             </a:pPr>
             <a:r>
-              <a:rPr lang="en-US" sz="1800" b="0" i="0" u="none">
+              <a:rPr lang="en-US" dirty="0" smtClean="0"/>
+              <a:t>&lt;</a:t>
+            </a:r>
+            <a:r>
+              <a:rPr lang="en-US" dirty="0" err="1" smtClean="0"/>
+              <a:t>th</a:t>
+            </a:r>
+            <a:r>
+              <a:rPr lang="en-US" dirty="0" smtClean="0"/>
+              <a:t>&gt; en-t</a:t>
+            </a:r>
+            <a:r>
+              <a:rPr lang="en-US" dirty="0" smtClean="0"/>
+              <a:t>ête de table</a:t>
+            </a:r>
+            <a:endParaRPr lang="en-US" sz="1800" b="0" i="0" u="none" dirty="0">
+              <a:solidFill>
+                <a:srgbClr val="404040"/>
+              </a:solidFill>
+              <a:latin typeface="Trebuchet MS"/>
+              <a:ea typeface="Trebuchet MS"/>
+              <a:cs typeface="Trebuchet MS"/>
+              <a:sym typeface="Trebuchet MS"/>
+            </a:endParaRPr>
+          </a:p>
+          <a:p>
+            <a:pPr marL="457200" marR="0" lvl="0" indent="-342900" algn="l" rtl="0">
+              <a:lnSpc>
+                <a:spcPct val="100000"/>
+              </a:lnSpc>
+              <a:spcBef>
+                <a:spcPts val="1000"/>
+              </a:spcBef>
+              <a:spcAft>
+                <a:spcPts val="0"/>
+              </a:spcAft>
+              <a:buClr>
+                <a:srgbClr val="404040"/>
+              </a:buClr>
+              <a:buSzPct val="100000"/>
+              <a:buFont typeface="Trebuchet MS"/>
+            </a:pPr>
+            <a:r>
+              <a:rPr lang="en-US" sz="1800" b="0" i="0" u="none" dirty="0">
                 <a:solidFill>
                   <a:srgbClr val="404040"/>
                 </a:solidFill>
@@ -37145,7 +37404,103 @@
                 <a:cs typeface="Trebuchet MS"/>
                 <a:sym typeface="Trebuchet MS"/>
               </a:rPr>
-              <a:t>&lt;td&gt; (cellule, colonne) attributs: colspan, rowspan, width.</a:t>
+              <a:t>&lt;td&gt; (cellule, </a:t>
+            </a:r>
+            <a:r>
+              <a:rPr lang="en-US" sz="1800" b="0" i="0" u="none" dirty="0" err="1">
+                <a:solidFill>
+                  <a:srgbClr val="404040"/>
+                </a:solidFill>
+                <a:latin typeface="Trebuchet MS"/>
+                <a:ea typeface="Trebuchet MS"/>
+                <a:cs typeface="Trebuchet MS"/>
+                <a:sym typeface="Trebuchet MS"/>
+              </a:rPr>
+              <a:t>colonne</a:t>
+            </a:r>
+            <a:r>
+              <a:rPr lang="en-US" sz="1800" b="0" i="0" u="none" dirty="0">
+                <a:solidFill>
+                  <a:srgbClr val="404040"/>
+                </a:solidFill>
+                <a:latin typeface="Trebuchet MS"/>
+                <a:ea typeface="Trebuchet MS"/>
+                <a:cs typeface="Trebuchet MS"/>
+                <a:sym typeface="Trebuchet MS"/>
+              </a:rPr>
+              <a:t>) </a:t>
+            </a:r>
+            <a:r>
+              <a:rPr lang="en-US" sz="1800" b="0" i="0" u="none" dirty="0" err="1">
+                <a:solidFill>
+                  <a:srgbClr val="404040"/>
+                </a:solidFill>
+                <a:latin typeface="Trebuchet MS"/>
+                <a:ea typeface="Trebuchet MS"/>
+                <a:cs typeface="Trebuchet MS"/>
+                <a:sym typeface="Trebuchet MS"/>
+              </a:rPr>
+              <a:t>attributs</a:t>
+            </a:r>
+            <a:r>
+              <a:rPr lang="en-US" sz="1800" b="0" i="0" u="none" dirty="0">
+                <a:solidFill>
+                  <a:srgbClr val="404040"/>
+                </a:solidFill>
+                <a:latin typeface="Trebuchet MS"/>
+                <a:ea typeface="Trebuchet MS"/>
+                <a:cs typeface="Trebuchet MS"/>
+                <a:sym typeface="Trebuchet MS"/>
+              </a:rPr>
+              <a:t>: </a:t>
+            </a:r>
+            <a:r>
+              <a:rPr lang="en-US" sz="1800" b="0" i="0" u="none" dirty="0" err="1">
+                <a:solidFill>
+                  <a:srgbClr val="404040"/>
+                </a:solidFill>
+                <a:latin typeface="Trebuchet MS"/>
+                <a:ea typeface="Trebuchet MS"/>
+                <a:cs typeface="Trebuchet MS"/>
+                <a:sym typeface="Trebuchet MS"/>
+              </a:rPr>
+              <a:t>colspan</a:t>
+            </a:r>
+            <a:r>
+              <a:rPr lang="en-US" sz="1800" b="0" i="0" u="none" dirty="0">
+                <a:solidFill>
+                  <a:srgbClr val="404040"/>
+                </a:solidFill>
+                <a:latin typeface="Trebuchet MS"/>
+                <a:ea typeface="Trebuchet MS"/>
+                <a:cs typeface="Trebuchet MS"/>
+                <a:sym typeface="Trebuchet MS"/>
+              </a:rPr>
+              <a:t>, </a:t>
+            </a:r>
+            <a:r>
+              <a:rPr lang="en-US" sz="1800" b="0" i="0" u="none" dirty="0" err="1">
+                <a:solidFill>
+                  <a:srgbClr val="404040"/>
+                </a:solidFill>
+                <a:latin typeface="Trebuchet MS"/>
+                <a:ea typeface="Trebuchet MS"/>
+                <a:cs typeface="Trebuchet MS"/>
+                <a:sym typeface="Trebuchet MS"/>
+              </a:rPr>
+              <a:t>rowspan</a:t>
+            </a:r>
+            <a:r>
+              <a:rPr lang="en-US" sz="1800" b="0" i="0" u="none" dirty="0">
+                <a:solidFill>
+                  <a:srgbClr val="404040"/>
+                </a:solidFill>
+                <a:latin typeface="Trebuchet MS"/>
+                <a:ea typeface="Trebuchet MS"/>
+                <a:cs typeface="Trebuchet MS"/>
+                <a:sym typeface="Trebuchet MS"/>
+              </a:rPr>
+              <a:t>, width.</a:t>
             </a:r>
           </a:p>
           <a:p>
@@ -37163,7 +37518,7 @@
               <a:buFont typeface="Noto Sans Symbols"/>
               <a:buNone/>
             </a:pPr>
-            <a:endParaRPr sz="1800" b="0" i="0" u="none">
+            <a:endParaRPr sz="1800" b="0" i="0" u="none" dirty="0">
               <a:solidFill>
                 <a:srgbClr val="404040"/>
               </a:solidFill>
@@ -37311,7 +37666,7 @@
               <a:buNone/>
             </a:pPr>
             <a:r>
-              <a:rPr lang="en-US" sz="3600" b="0" i="0" u="none" strike="noStrike" cap="none">
+              <a:rPr lang="en-US" sz="3600" b="0" i="0" u="none" strike="noStrike" cap="none" dirty="0" smtClean="0">
                 <a:solidFill>
                   <a:schemeClr val="accent1"/>
                 </a:solidFill>
@@ -37320,8 +37675,17 @@
                 <a:cs typeface="Trebuchet MS"/>
                 <a:sym typeface="Trebuchet MS"/>
               </a:rPr>
-              <a:t>La troika des tableaux</a:t>
+              <a:t>Les tableaux</a:t>
             </a:r>
+            <a:endParaRPr lang="en-US" sz="3600" b="0" i="0" u="none" strike="noStrike" cap="none" dirty="0">
+              <a:solidFill>
+                <a:schemeClr val="accent1"/>
+              </a:solidFill>
+              <a:latin typeface="Trebuchet MS"/>
+              <a:ea typeface="Trebuchet MS"/>
+              <a:cs typeface="Trebuchet MS"/>
+              <a:sym typeface="Trebuchet MS"/>
+            </a:endParaRPr>
           </a:p>
         </p:txBody>
       </p:sp>
@@ -37451,7 +37815,13 @@
         <p:nvGraphicFramePr>
           <p:cNvPr id="377" name="Shape 377"/>
           <p:cNvGraphicFramePr/>
-          <p:nvPr/>
+          <p:nvPr>
+            <p:extLst>
+              <p:ext uri="{D42A27DB-BD31-4B8C-83A1-F6EECF244321}">
+                <p14:modId xmlns:p14="http://schemas.microsoft.com/office/powerpoint/2010/main" val="810311803"/>
+              </p:ext>
+            </p:extLst>
+          </p:nvPr>
         </p:nvGraphicFramePr>
         <p:xfrm>
           <a:off x="2124075" y="2362200"/>
@@ -37493,7 +37863,7 @@
                         <a:buNone/>
                       </a:pPr>
                       <a:r>
-                        <a:rPr lang="en-US" sz="1800" b="1" i="0" u="none">
+                        <a:rPr lang="en-US" sz="1800" b="1" i="0" u="none" dirty="0" err="1" smtClean="0">
                           <a:solidFill>
                             <a:srgbClr val="FFFFFF"/>
                           </a:solidFill>
@@ -37502,7 +37872,55 @@
                           <a:cs typeface="Trebuchet MS"/>
                           <a:sym typeface="Trebuchet MS"/>
                         </a:rPr>
-                        <a:t>td (colonne)</a:t>
+                        <a:t>th</a:t>
+                      </a:r>
+                      <a:r>
+                        <a:rPr lang="en-US" sz="1800" b="1" i="0" u="none" dirty="0" smtClean="0">
+                          <a:solidFill>
+                            <a:srgbClr val="FFFFFF"/>
+                          </a:solidFill>
+                          <a:latin typeface="Trebuchet MS"/>
+                          <a:ea typeface="Trebuchet MS"/>
+                          <a:cs typeface="Trebuchet MS"/>
+                          <a:sym typeface="Trebuchet MS"/>
+                        </a:rPr>
+                        <a:t> </a:t>
+                      </a:r>
+                      <a:r>
+                        <a:rPr lang="en-US" sz="1800" b="1" i="0" u="none" dirty="0">
+                          <a:solidFill>
+                            <a:srgbClr val="FFFFFF"/>
+                          </a:solidFill>
+                          <a:latin typeface="Trebuchet MS"/>
+                          <a:ea typeface="Trebuchet MS"/>
+                          <a:cs typeface="Trebuchet MS"/>
+                          <a:sym typeface="Trebuchet MS"/>
+                        </a:rPr>
+                        <a:t>(</a:t>
+                      </a:r>
+                      <a:r>
+                        <a:rPr lang="en-US" sz="1800" b="1" i="0" u="none" dirty="0" err="1">
+                          <a:solidFill>
+                            <a:srgbClr val="FFFFFF"/>
+                          </a:solidFill>
+                          <a:latin typeface="Trebuchet MS"/>
+                          <a:ea typeface="Trebuchet MS"/>
+                          <a:cs typeface="Trebuchet MS"/>
+                          <a:sym typeface="Trebuchet MS"/>
+                        </a:rPr>
+                        <a:t>colonne</a:t>
+                      </a:r>
+                      <a:r>
+                        <a:rPr lang="en-US" sz="1800" b="1" i="0" u="none" dirty="0">
+                          <a:solidFill>
+                            <a:srgbClr val="FFFFFF"/>
+                          </a:solidFill>
+                          <a:latin typeface="Trebuchet MS"/>
+                          <a:ea typeface="Trebuchet MS"/>
+                          <a:cs typeface="Trebuchet MS"/>
+                          <a:sym typeface="Trebuchet MS"/>
+                        </a:rPr>
+                        <a:t>)</a:t>
                       </a:r>
                     </a:p>
                   </a:txBody>
@@ -37571,7 +37989,7 @@
                         <a:buNone/>
                       </a:pPr>
                       <a:r>
-                        <a:rPr lang="en-US" sz="1800" b="1" i="0" u="none">
+                        <a:rPr lang="en-US" sz="1800" b="1" i="0" u="none" dirty="0" err="1" smtClean="0">
                           <a:solidFill>
                             <a:srgbClr val="FFFFFF"/>
                           </a:solidFill>
@@ -37580,8 +37998,17 @@
                           <a:cs typeface="Trebuchet MS"/>
                           <a:sym typeface="Trebuchet MS"/>
                         </a:rPr>
-                        <a:t>td</a:t>
+                        <a:t>th</a:t>
                       </a:r>
+                      <a:endParaRPr lang="en-US" sz="1800" b="1" i="0" u="none" dirty="0">
+                        <a:solidFill>
+                          <a:srgbClr val="FFFFFF"/>
+                        </a:solidFill>
+                        <a:latin typeface="Trebuchet MS"/>
+                        <a:ea typeface="Trebuchet MS"/>
+                        <a:cs typeface="Trebuchet MS"/>
+                        <a:sym typeface="Trebuchet MS"/>
+                      </a:endParaRPr>
                     </a:p>
                   </a:txBody>
                   <a:tcPr marL="91425" marR="91425" marT="45725" marB="45725">
@@ -37649,7 +38076,7 @@
                         <a:buNone/>
                       </a:pPr>
                       <a:r>
-                        <a:rPr lang="en-US" sz="1800" b="1" i="0" u="none">
+                        <a:rPr lang="en-US" sz="1800" b="1" i="0" u="none" dirty="0" err="1" smtClean="0">
                           <a:solidFill>
                             <a:srgbClr val="FFFFFF"/>
                           </a:solidFill>
@@ -37658,8 +38085,17 @@
                           <a:cs typeface="Trebuchet MS"/>
                           <a:sym typeface="Trebuchet MS"/>
                         </a:rPr>
-                        <a:t>td</a:t>
+                        <a:t>th</a:t>
                       </a:r>
+                      <a:endParaRPr lang="en-US" sz="1800" b="1" i="0" u="none" dirty="0">
+                        <a:solidFill>
+                          <a:srgbClr val="FFFFFF"/>
+                        </a:solidFill>
+                        <a:latin typeface="Trebuchet MS"/>
+                        <a:ea typeface="Trebuchet MS"/>
+                        <a:cs typeface="Trebuchet MS"/>
+                        <a:sym typeface="Trebuchet MS"/>
+                      </a:endParaRPr>
                     </a:p>
                   </a:txBody>
                   <a:tcPr marL="91425" marR="91425" marT="45725" marB="45725">
@@ -38121,7 +38557,7 @@
                         <a:buNone/>
                       </a:pPr>
                       <a:r>
-                        <a:rPr lang="en-US" sz="1800" b="0" i="0" u="none">
+                        <a:rPr lang="en-US" sz="1800" b="0" i="0" u="none" dirty="0">
                           <a:solidFill>
                             <a:srgbClr val="000000"/>
                           </a:solidFill>
@@ -38490,6 +38926,614 @@
   <p:cSld>
     <p:spTree>
       <p:nvGrpSpPr>
+        <p:cNvPr id="1" name="Shape 395"/>
+        <p:cNvGrpSpPr/>
+        <p:nvPr/>
+      </p:nvGrpSpPr>
+      <p:grpSpPr>
+        <a:xfrm>
+          <a:off x="0" y="0"/>
+          <a:ext cx="0" cy="0"/>
+          <a:chOff x="0" y="0"/>
+          <a:chExt cx="0" cy="0"/>
+        </a:xfrm>
+      </p:grpSpPr>
+      <p:sp>
+        <p:nvSpPr>
+          <p:cNvPr id="396" name="Shape 396"/>
+          <p:cNvSpPr txBox="1">
+            <a:spLocks noGrp="1"/>
+          </p:cNvSpPr>
+          <p:nvPr>
+            <p:ph type="title"/>
+          </p:nvPr>
+        </p:nvSpPr>
+        <p:spPr>
+          <a:xfrm>
+            <a:off x="457200" y="381000"/>
+            <a:ext cx="8231187" cy="911224"/>
+          </a:xfrm>
+          <a:prstGeom prst="rect">
+            <a:avLst/>
+          </a:prstGeom>
+          <a:noFill/>
+          <a:ln>
+            <a:noFill/>
+          </a:ln>
+        </p:spPr>
+        <p:txBody>
+          <a:bodyPr lIns="90000" tIns="46800" rIns="90000" bIns="46800" anchor="t" anchorCtr="0">
+            <a:noAutofit/>
+          </a:bodyPr>
+          <a:lstStyle/>
+          <a:p>
+            <a:pPr marL="0" marR="0" lvl="0" indent="0" algn="l" rtl="0">
+              <a:lnSpc>
+                <a:spcPct val="100000"/>
+              </a:lnSpc>
+              <a:spcBef>
+                <a:spcPts val="0"/>
+              </a:spcBef>
+              <a:spcAft>
+                <a:spcPts val="0"/>
+              </a:spcAft>
+              <a:buClr>
+                <a:schemeClr val="accent1"/>
+              </a:buClr>
+              <a:buSzPct val="25000"/>
+              <a:buFont typeface="Trebuchet MS"/>
+              <a:buNone/>
+            </a:pPr>
+            <a:r>
+              <a:rPr lang="en-US" sz="3600" b="0" i="0" u="none" strike="noStrike" cap="none">
+                <a:solidFill>
+                  <a:schemeClr val="accent1"/>
+                </a:solidFill>
+                <a:latin typeface="Trebuchet MS"/>
+                <a:ea typeface="Trebuchet MS"/>
+                <a:cs typeface="Trebuchet MS"/>
+                <a:sym typeface="Trebuchet MS"/>
+              </a:rPr>
+              <a:t>Les tableaux</a:t>
+            </a:r>
+          </a:p>
+        </p:txBody>
+      </p:sp>
+      <p:sp>
+        <p:nvSpPr>
+          <p:cNvPr id="397" name="Shape 397"/>
+          <p:cNvSpPr txBox="1">
+            <a:spLocks noGrp="1"/>
+          </p:cNvSpPr>
+          <p:nvPr>
+            <p:ph type="body" idx="1"/>
+          </p:nvPr>
+        </p:nvSpPr>
+        <p:spPr>
+          <a:xfrm>
+            <a:off x="457200" y="1600200"/>
+            <a:ext cx="8229600" cy="4700587"/>
+          </a:xfrm>
+          <a:prstGeom prst="rect">
+            <a:avLst/>
+          </a:prstGeom>
+          <a:noFill/>
+          <a:ln>
+            <a:noFill/>
+          </a:ln>
+        </p:spPr>
+        <p:txBody>
+          <a:bodyPr lIns="90000" tIns="46800" rIns="90000" bIns="46800" anchor="t" anchorCtr="0">
+            <a:noAutofit/>
+          </a:bodyPr>
+          <a:lstStyle/>
+          <a:p>
+            <a:pPr marL="0" marR="0" lvl="0" indent="0" algn="l" rtl="0">
+              <a:lnSpc>
+                <a:spcPct val="80000"/>
+              </a:lnSpc>
+              <a:spcBef>
+                <a:spcPts val="400"/>
+              </a:spcBef>
+              <a:spcAft>
+                <a:spcPts val="0"/>
+              </a:spcAft>
+              <a:buNone/>
+            </a:pPr>
+            <a:r>
+              <a:rPr lang="en-US" sz="1600" b="0" i="0" u="none">
+                <a:solidFill>
+                  <a:srgbClr val="404040"/>
+                </a:solidFill>
+                <a:latin typeface="Trebuchet MS"/>
+                <a:ea typeface="Trebuchet MS"/>
+                <a:cs typeface="Trebuchet MS"/>
+                <a:sym typeface="Trebuchet MS"/>
+              </a:rPr>
+              <a:t>&lt;table&gt;</a:t>
+            </a:r>
+          </a:p>
+          <a:p>
+            <a:pPr marL="0" marR="0" lvl="0" indent="0" algn="l" rtl="0">
+              <a:lnSpc>
+                <a:spcPct val="80000"/>
+              </a:lnSpc>
+              <a:spcBef>
+                <a:spcPts val="400"/>
+              </a:spcBef>
+              <a:spcAft>
+                <a:spcPts val="0"/>
+              </a:spcAft>
+              <a:buNone/>
+            </a:pPr>
+            <a:r>
+              <a:rPr lang="en-US" sz="1600" b="0" i="0" u="none">
+                <a:solidFill>
+                  <a:srgbClr val="404040"/>
+                </a:solidFill>
+                <a:latin typeface="Trebuchet MS"/>
+                <a:ea typeface="Trebuchet MS"/>
+                <a:cs typeface="Trebuchet MS"/>
+                <a:sym typeface="Trebuchet MS"/>
+              </a:rPr>
+              <a:t>    &lt;tr&gt;</a:t>
+            </a:r>
+          </a:p>
+          <a:p>
+            <a:pPr marL="0" marR="0" lvl="0" indent="0" algn="l" rtl="0">
+              <a:lnSpc>
+                <a:spcPct val="80000"/>
+              </a:lnSpc>
+              <a:spcBef>
+                <a:spcPts val="400"/>
+              </a:spcBef>
+              <a:spcAft>
+                <a:spcPts val="0"/>
+              </a:spcAft>
+              <a:buNone/>
+            </a:pPr>
+            <a:r>
+              <a:rPr lang="en-US" sz="1600" b="0" i="0" u="none">
+                <a:solidFill>
+                  <a:srgbClr val="404040"/>
+                </a:solidFill>
+                <a:latin typeface="Trebuchet MS"/>
+                <a:ea typeface="Trebuchet MS"/>
+                <a:cs typeface="Trebuchet MS"/>
+                <a:sym typeface="Trebuchet MS"/>
+              </a:rPr>
+              <a:t>      &lt;td&gt;Colonne 1 ligne 1&lt;/td&gt;</a:t>
+            </a:r>
+          </a:p>
+          <a:p>
+            <a:pPr marL="0" marR="0" lvl="0" indent="0" algn="l" rtl="0">
+              <a:lnSpc>
+                <a:spcPct val="80000"/>
+              </a:lnSpc>
+              <a:spcBef>
+                <a:spcPts val="400"/>
+              </a:spcBef>
+              <a:spcAft>
+                <a:spcPts val="0"/>
+              </a:spcAft>
+              <a:buNone/>
+            </a:pPr>
+            <a:r>
+              <a:rPr lang="en-US" sz="1600" b="0" i="0" u="none">
+                <a:solidFill>
+                  <a:srgbClr val="404040"/>
+                </a:solidFill>
+                <a:latin typeface="Trebuchet MS"/>
+                <a:ea typeface="Trebuchet MS"/>
+                <a:cs typeface="Trebuchet MS"/>
+                <a:sym typeface="Trebuchet MS"/>
+              </a:rPr>
+              <a:t>      &lt;td&gt;Colonne 2 ligne 1&lt;/td&gt;</a:t>
+            </a:r>
+          </a:p>
+          <a:p>
+            <a:pPr marL="0" marR="0" lvl="0" indent="0" algn="l" rtl="0">
+              <a:lnSpc>
+                <a:spcPct val="80000"/>
+              </a:lnSpc>
+              <a:spcBef>
+                <a:spcPts val="400"/>
+              </a:spcBef>
+              <a:spcAft>
+                <a:spcPts val="0"/>
+              </a:spcAft>
+              <a:buNone/>
+            </a:pPr>
+            <a:r>
+              <a:rPr lang="en-US" sz="1600" b="0" i="0" u="none">
+                <a:solidFill>
+                  <a:srgbClr val="404040"/>
+                </a:solidFill>
+                <a:latin typeface="Trebuchet MS"/>
+                <a:ea typeface="Trebuchet MS"/>
+                <a:cs typeface="Trebuchet MS"/>
+                <a:sym typeface="Trebuchet MS"/>
+              </a:rPr>
+              <a:t>      &lt;td&gt;Colonne 3 ligne 1&lt;/td&gt;</a:t>
+            </a:r>
+          </a:p>
+          <a:p>
+            <a:pPr marL="0" marR="0" lvl="0" indent="0" algn="l" rtl="0">
+              <a:lnSpc>
+                <a:spcPct val="80000"/>
+              </a:lnSpc>
+              <a:spcBef>
+                <a:spcPts val="400"/>
+              </a:spcBef>
+              <a:spcAft>
+                <a:spcPts val="0"/>
+              </a:spcAft>
+              <a:buNone/>
+            </a:pPr>
+            <a:r>
+              <a:rPr lang="en-US" sz="1600" b="0" i="0" u="none">
+                <a:solidFill>
+                  <a:srgbClr val="404040"/>
+                </a:solidFill>
+                <a:latin typeface="Trebuchet MS"/>
+                <a:ea typeface="Trebuchet MS"/>
+                <a:cs typeface="Trebuchet MS"/>
+                <a:sym typeface="Trebuchet MS"/>
+              </a:rPr>
+              <a:t>    &lt;/tr&gt;</a:t>
+            </a:r>
+          </a:p>
+          <a:p>
+            <a:pPr marL="0" marR="0" lvl="0" indent="0" algn="l" rtl="0">
+              <a:lnSpc>
+                <a:spcPct val="80000"/>
+              </a:lnSpc>
+              <a:spcBef>
+                <a:spcPts val="400"/>
+              </a:spcBef>
+              <a:spcAft>
+                <a:spcPts val="0"/>
+              </a:spcAft>
+              <a:buNone/>
+            </a:pPr>
+            <a:r>
+              <a:rPr lang="en-US" sz="1600" b="0" i="0" u="none">
+                <a:solidFill>
+                  <a:srgbClr val="404040"/>
+                </a:solidFill>
+                <a:latin typeface="Trebuchet MS"/>
+                <a:ea typeface="Trebuchet MS"/>
+                <a:cs typeface="Trebuchet MS"/>
+                <a:sym typeface="Trebuchet MS"/>
+              </a:rPr>
+              <a:t>    &lt;tr&gt;</a:t>
+            </a:r>
+          </a:p>
+          <a:p>
+            <a:pPr marL="0" marR="0" lvl="0" indent="0" algn="l" rtl="0">
+              <a:lnSpc>
+                <a:spcPct val="80000"/>
+              </a:lnSpc>
+              <a:spcBef>
+                <a:spcPts val="400"/>
+              </a:spcBef>
+              <a:spcAft>
+                <a:spcPts val="0"/>
+              </a:spcAft>
+              <a:buNone/>
+            </a:pPr>
+            <a:r>
+              <a:rPr lang="en-US" sz="1600" b="0" i="0" u="none">
+                <a:solidFill>
+                  <a:srgbClr val="404040"/>
+                </a:solidFill>
+                <a:latin typeface="Trebuchet MS"/>
+                <a:ea typeface="Trebuchet MS"/>
+                <a:cs typeface="Trebuchet MS"/>
+                <a:sym typeface="Trebuchet MS"/>
+              </a:rPr>
+              <a:t>      &lt;td&gt;Colonne 1 ligne 2&lt;/td&gt;</a:t>
+            </a:r>
+          </a:p>
+          <a:p>
+            <a:pPr marL="0" marR="0" lvl="0" indent="0" algn="l" rtl="0">
+              <a:lnSpc>
+                <a:spcPct val="80000"/>
+              </a:lnSpc>
+              <a:spcBef>
+                <a:spcPts val="400"/>
+              </a:spcBef>
+              <a:spcAft>
+                <a:spcPts val="0"/>
+              </a:spcAft>
+              <a:buNone/>
+            </a:pPr>
+            <a:r>
+              <a:rPr lang="en-US" sz="1600" b="0" i="0" u="none">
+                <a:solidFill>
+                  <a:srgbClr val="404040"/>
+                </a:solidFill>
+                <a:latin typeface="Trebuchet MS"/>
+                <a:ea typeface="Trebuchet MS"/>
+                <a:cs typeface="Trebuchet MS"/>
+                <a:sym typeface="Trebuchet MS"/>
+              </a:rPr>
+              <a:t>      &lt;td&gt;&lt;/td&gt;</a:t>
+            </a:r>
+          </a:p>
+          <a:p>
+            <a:pPr marL="0" marR="0" lvl="0" indent="0" algn="l" rtl="0">
+              <a:lnSpc>
+                <a:spcPct val="80000"/>
+              </a:lnSpc>
+              <a:spcBef>
+                <a:spcPts val="400"/>
+              </a:spcBef>
+              <a:spcAft>
+                <a:spcPts val="0"/>
+              </a:spcAft>
+              <a:buNone/>
+            </a:pPr>
+            <a:r>
+              <a:rPr lang="en-US" sz="1600" b="0" i="0" u="none">
+                <a:solidFill>
+                  <a:srgbClr val="404040"/>
+                </a:solidFill>
+                <a:latin typeface="Trebuchet MS"/>
+                <a:ea typeface="Trebuchet MS"/>
+                <a:cs typeface="Trebuchet MS"/>
+                <a:sym typeface="Trebuchet MS"/>
+              </a:rPr>
+              <a:t>      &lt;td&gt;&lt;/td&gt;</a:t>
+            </a:r>
+          </a:p>
+          <a:p>
+            <a:pPr marL="0" marR="0" lvl="0" indent="0" algn="l" rtl="0">
+              <a:lnSpc>
+                <a:spcPct val="80000"/>
+              </a:lnSpc>
+              <a:spcBef>
+                <a:spcPts val="400"/>
+              </a:spcBef>
+              <a:spcAft>
+                <a:spcPts val="0"/>
+              </a:spcAft>
+              <a:buNone/>
+            </a:pPr>
+            <a:r>
+              <a:rPr lang="en-US" sz="1600" b="0" i="0" u="none">
+                <a:solidFill>
+                  <a:srgbClr val="404040"/>
+                </a:solidFill>
+                <a:latin typeface="Trebuchet MS"/>
+                <a:ea typeface="Trebuchet MS"/>
+                <a:cs typeface="Trebuchet MS"/>
+                <a:sym typeface="Trebuchet MS"/>
+              </a:rPr>
+              <a:t>    &lt;/tr&gt;</a:t>
+            </a:r>
+          </a:p>
+          <a:p>
+            <a:pPr marL="0" marR="0" lvl="0" indent="0" algn="l" rtl="0">
+              <a:lnSpc>
+                <a:spcPct val="80000"/>
+              </a:lnSpc>
+              <a:spcBef>
+                <a:spcPts val="400"/>
+              </a:spcBef>
+              <a:spcAft>
+                <a:spcPts val="0"/>
+              </a:spcAft>
+              <a:buNone/>
+            </a:pPr>
+            <a:r>
+              <a:rPr lang="en-US" sz="1600" b="0" i="0" u="none">
+                <a:solidFill>
+                  <a:srgbClr val="404040"/>
+                </a:solidFill>
+                <a:latin typeface="Trebuchet MS"/>
+                <a:ea typeface="Trebuchet MS"/>
+                <a:cs typeface="Trebuchet MS"/>
+                <a:sym typeface="Trebuchet MS"/>
+              </a:rPr>
+              <a:t>    &lt;tr&gt;</a:t>
+            </a:r>
+          </a:p>
+          <a:p>
+            <a:pPr marL="0" marR="0" lvl="0" indent="0" algn="l" rtl="0">
+              <a:lnSpc>
+                <a:spcPct val="80000"/>
+              </a:lnSpc>
+              <a:spcBef>
+                <a:spcPts val="400"/>
+              </a:spcBef>
+              <a:spcAft>
+                <a:spcPts val="0"/>
+              </a:spcAft>
+              <a:buNone/>
+            </a:pPr>
+            <a:r>
+              <a:rPr lang="en-US" sz="1600" b="0" i="0" u="none">
+                <a:solidFill>
+                  <a:srgbClr val="404040"/>
+                </a:solidFill>
+                <a:latin typeface="Trebuchet MS"/>
+                <a:ea typeface="Trebuchet MS"/>
+                <a:cs typeface="Trebuchet MS"/>
+                <a:sym typeface="Trebuchet MS"/>
+              </a:rPr>
+              <a:t>      &lt;td&gt;Colonne 1 ligne 3&lt;/td&gt;</a:t>
+            </a:r>
+          </a:p>
+          <a:p>
+            <a:pPr marL="0" marR="0" lvl="0" indent="0" algn="l" rtl="0">
+              <a:lnSpc>
+                <a:spcPct val="80000"/>
+              </a:lnSpc>
+              <a:spcBef>
+                <a:spcPts val="400"/>
+              </a:spcBef>
+              <a:spcAft>
+                <a:spcPts val="0"/>
+              </a:spcAft>
+              <a:buNone/>
+            </a:pPr>
+            <a:r>
+              <a:rPr lang="en-US" sz="1600" b="0" i="0" u="none">
+                <a:solidFill>
+                  <a:srgbClr val="404040"/>
+                </a:solidFill>
+                <a:latin typeface="Trebuchet MS"/>
+                <a:ea typeface="Trebuchet MS"/>
+                <a:cs typeface="Trebuchet MS"/>
+                <a:sym typeface="Trebuchet MS"/>
+              </a:rPr>
+              <a:t>      &lt;td&gt;&lt;/td&gt;</a:t>
+            </a:r>
+          </a:p>
+          <a:p>
+            <a:pPr marL="0" marR="0" lvl="0" indent="0" algn="l" rtl="0">
+              <a:lnSpc>
+                <a:spcPct val="80000"/>
+              </a:lnSpc>
+              <a:spcBef>
+                <a:spcPts val="400"/>
+              </a:spcBef>
+              <a:spcAft>
+                <a:spcPts val="0"/>
+              </a:spcAft>
+              <a:buNone/>
+            </a:pPr>
+            <a:r>
+              <a:rPr lang="en-US" sz="1600" b="0" i="0" u="none">
+                <a:solidFill>
+                  <a:srgbClr val="404040"/>
+                </a:solidFill>
+                <a:latin typeface="Trebuchet MS"/>
+                <a:ea typeface="Trebuchet MS"/>
+                <a:cs typeface="Trebuchet MS"/>
+                <a:sym typeface="Trebuchet MS"/>
+              </a:rPr>
+              <a:t>      &lt;td&gt;&lt;/td&gt;</a:t>
+            </a:r>
+          </a:p>
+          <a:p>
+            <a:pPr marL="0" marR="0" lvl="0" indent="0" algn="l" rtl="0">
+              <a:lnSpc>
+                <a:spcPct val="80000"/>
+              </a:lnSpc>
+              <a:spcBef>
+                <a:spcPts val="400"/>
+              </a:spcBef>
+              <a:spcAft>
+                <a:spcPts val="0"/>
+              </a:spcAft>
+              <a:buNone/>
+            </a:pPr>
+            <a:r>
+              <a:rPr lang="en-US" sz="1600" b="0" i="0" u="none">
+                <a:solidFill>
+                  <a:srgbClr val="404040"/>
+                </a:solidFill>
+                <a:latin typeface="Trebuchet MS"/>
+                <a:ea typeface="Trebuchet MS"/>
+                <a:cs typeface="Trebuchet MS"/>
+                <a:sym typeface="Trebuchet MS"/>
+              </a:rPr>
+              <a:t>    &lt;/tr&gt;</a:t>
+            </a:r>
+          </a:p>
+          <a:p>
+            <a:pPr marL="0" marR="0" lvl="0" indent="0" algn="l" rtl="0">
+              <a:lnSpc>
+                <a:spcPct val="80000"/>
+              </a:lnSpc>
+              <a:spcBef>
+                <a:spcPts val="400"/>
+              </a:spcBef>
+              <a:spcAft>
+                <a:spcPts val="0"/>
+              </a:spcAft>
+              <a:buNone/>
+            </a:pPr>
+            <a:r>
+              <a:rPr lang="en-US" sz="1600" b="0" i="0" u="none">
+                <a:solidFill>
+                  <a:srgbClr val="404040"/>
+                </a:solidFill>
+                <a:latin typeface="Trebuchet MS"/>
+                <a:ea typeface="Trebuchet MS"/>
+                <a:cs typeface="Trebuchet MS"/>
+                <a:sym typeface="Trebuchet MS"/>
+              </a:rPr>
+              <a:t> &lt;/table&gt;</a:t>
+            </a:r>
+          </a:p>
+          <a:p>
+            <a:pPr marL="0" marR="0" lvl="0" indent="0" algn="l" rtl="0">
+              <a:spcBef>
+                <a:spcPts val="1000"/>
+              </a:spcBef>
+              <a:spcAft>
+                <a:spcPts val="0"/>
+              </a:spcAft>
+              <a:buNone/>
+            </a:pPr>
+            <a:endParaRPr sz="1600" b="0" i="0" u="none">
+              <a:solidFill>
+                <a:srgbClr val="404040"/>
+              </a:solidFill>
+              <a:latin typeface="Trebuchet MS"/>
+              <a:ea typeface="Trebuchet MS"/>
+              <a:cs typeface="Trebuchet MS"/>
+              <a:sym typeface="Trebuchet MS"/>
+            </a:endParaRPr>
+          </a:p>
+        </p:txBody>
+      </p:sp>
+      <p:pic>
+        <p:nvPicPr>
+          <p:cNvPr id="398" name="Shape 398"/>
+          <p:cNvPicPr preferRelativeResize="0"/>
+          <p:nvPr/>
+        </p:nvPicPr>
+        <p:blipFill rotWithShape="1">
+          <a:blip r:embed="rId3">
+            <a:alphaModFix/>
+          </a:blip>
+          <a:srcRect l="21874" t="21665" r="51249" b="69166"/>
+          <a:stretch/>
+        </p:blipFill>
+        <p:spPr>
+          <a:xfrm>
+            <a:off x="4067175" y="4652962"/>
+            <a:ext cx="4373562" cy="1119187"/>
+          </a:xfrm>
+          <a:prstGeom prst="rect">
+            <a:avLst/>
+          </a:prstGeom>
+          <a:noFill/>
+          <a:ln>
+            <a:noFill/>
+          </a:ln>
+        </p:spPr>
+      </p:pic>
+    </p:spTree>
+  </p:cSld>
+  <p:clrMapOvr>
+    <a:masterClrMapping/>
+  </p:clrMapOvr>
+  <p:transition xmlns:p14="http://schemas.microsoft.com/office/powerpoint/2010/main" spd="med">
+    <p:fade/>
+  </p:transition>
+</p:sld>
+</file>
+
+<file path=ppt/slides/slide39.xml><?xml version="1.0" encoding="utf-8"?>
+<p:sld xmlns:a="http://schemas.openxmlformats.org/drawingml/2006/main" xmlns:r="http://schemas.openxmlformats.org/officeDocument/2006/relationships" xmlns:p="http://schemas.openxmlformats.org/presentationml/2006/main">
+  <p:cSld>
+    <p:spTree>
+      <p:nvGrpSpPr>
         <p:cNvPr id="1" name="Shape 389"/>
         <p:cNvGrpSpPr/>
         <p:nvPr/>
@@ -38776,614 +39820,6 @@
           </a:p>
         </p:txBody>
       </p:sp>
-    </p:spTree>
-  </p:cSld>
-  <p:clrMapOvr>
-    <a:masterClrMapping/>
-  </p:clrMapOvr>
-  <p:transition xmlns:p14="http://schemas.microsoft.com/office/powerpoint/2010/main" spd="med">
-    <p:fade/>
-  </p:transition>
-</p:sld>
-</file>
-
-<file path=ppt/slides/slide39.xml><?xml version="1.0" encoding="utf-8"?>
-<p:sld xmlns:a="http://schemas.openxmlformats.org/drawingml/2006/main" xmlns:r="http://schemas.openxmlformats.org/officeDocument/2006/relationships" xmlns:p="http://schemas.openxmlformats.org/presentationml/2006/main">
-  <p:cSld>
-    <p:spTree>
-      <p:nvGrpSpPr>
-        <p:cNvPr id="1" name="Shape 395"/>
-        <p:cNvGrpSpPr/>
-        <p:nvPr/>
-      </p:nvGrpSpPr>
-      <p:grpSpPr>
-        <a:xfrm>
-          <a:off x="0" y="0"/>
-          <a:ext cx="0" cy="0"/>
-          <a:chOff x="0" y="0"/>
-          <a:chExt cx="0" cy="0"/>
-        </a:xfrm>
-      </p:grpSpPr>
-      <p:sp>
-        <p:nvSpPr>
-          <p:cNvPr id="396" name="Shape 396"/>
-          <p:cNvSpPr txBox="1">
-            <a:spLocks noGrp="1"/>
-          </p:cNvSpPr>
-          <p:nvPr>
-            <p:ph type="title"/>
-          </p:nvPr>
-        </p:nvSpPr>
-        <p:spPr>
-          <a:xfrm>
-            <a:off x="457200" y="381000"/>
-            <a:ext cx="8231187" cy="911224"/>
-          </a:xfrm>
-          <a:prstGeom prst="rect">
-            <a:avLst/>
-          </a:prstGeom>
-          <a:noFill/>
-          <a:ln>
-            <a:noFill/>
-          </a:ln>
-        </p:spPr>
-        <p:txBody>
-          <a:bodyPr lIns="90000" tIns="46800" rIns="90000" bIns="46800" anchor="t" anchorCtr="0">
-            <a:noAutofit/>
-          </a:bodyPr>
-          <a:lstStyle/>
-          <a:p>
-            <a:pPr marL="0" marR="0" lvl="0" indent="0" algn="l" rtl="0">
-              <a:lnSpc>
-                <a:spcPct val="100000"/>
-              </a:lnSpc>
-              <a:spcBef>
-                <a:spcPts val="0"/>
-              </a:spcBef>
-              <a:spcAft>
-                <a:spcPts val="0"/>
-              </a:spcAft>
-              <a:buClr>
-                <a:schemeClr val="accent1"/>
-              </a:buClr>
-              <a:buSzPct val="25000"/>
-              <a:buFont typeface="Trebuchet MS"/>
-              <a:buNone/>
-            </a:pPr>
-            <a:r>
-              <a:rPr lang="en-US" sz="3600" b="0" i="0" u="none" strike="noStrike" cap="none">
-                <a:solidFill>
-                  <a:schemeClr val="accent1"/>
-                </a:solidFill>
-                <a:latin typeface="Trebuchet MS"/>
-                <a:ea typeface="Trebuchet MS"/>
-                <a:cs typeface="Trebuchet MS"/>
-                <a:sym typeface="Trebuchet MS"/>
-              </a:rPr>
-              <a:t>Les tableaux</a:t>
-            </a:r>
-          </a:p>
-        </p:txBody>
-      </p:sp>
-      <p:sp>
-        <p:nvSpPr>
-          <p:cNvPr id="397" name="Shape 397"/>
-          <p:cNvSpPr txBox="1">
-            <a:spLocks noGrp="1"/>
-          </p:cNvSpPr>
-          <p:nvPr>
-            <p:ph type="body" idx="1"/>
-          </p:nvPr>
-        </p:nvSpPr>
-        <p:spPr>
-          <a:xfrm>
-            <a:off x="457200" y="1600200"/>
-            <a:ext cx="8229600" cy="4700587"/>
-          </a:xfrm>
-          <a:prstGeom prst="rect">
-            <a:avLst/>
-          </a:prstGeom>
-          <a:noFill/>
-          <a:ln>
-            <a:noFill/>
-          </a:ln>
-        </p:spPr>
-        <p:txBody>
-          <a:bodyPr lIns="90000" tIns="46800" rIns="90000" bIns="46800" anchor="t" anchorCtr="0">
-            <a:noAutofit/>
-          </a:bodyPr>
-          <a:lstStyle/>
-          <a:p>
-            <a:pPr marL="0" marR="0" lvl="0" indent="0" algn="l" rtl="0">
-              <a:lnSpc>
-                <a:spcPct val="80000"/>
-              </a:lnSpc>
-              <a:spcBef>
-                <a:spcPts val="400"/>
-              </a:spcBef>
-              <a:spcAft>
-                <a:spcPts val="0"/>
-              </a:spcAft>
-              <a:buNone/>
-            </a:pPr>
-            <a:r>
-              <a:rPr lang="en-US" sz="1600" b="0" i="0" u="none">
-                <a:solidFill>
-                  <a:srgbClr val="404040"/>
-                </a:solidFill>
-                <a:latin typeface="Trebuchet MS"/>
-                <a:ea typeface="Trebuchet MS"/>
-                <a:cs typeface="Trebuchet MS"/>
-                <a:sym typeface="Trebuchet MS"/>
-              </a:rPr>
-              <a:t>&lt;table&gt;</a:t>
-            </a:r>
-          </a:p>
-          <a:p>
-            <a:pPr marL="0" marR="0" lvl="0" indent="0" algn="l" rtl="0">
-              <a:lnSpc>
-                <a:spcPct val="80000"/>
-              </a:lnSpc>
-              <a:spcBef>
-                <a:spcPts val="400"/>
-              </a:spcBef>
-              <a:spcAft>
-                <a:spcPts val="0"/>
-              </a:spcAft>
-              <a:buNone/>
-            </a:pPr>
-            <a:r>
-              <a:rPr lang="en-US" sz="1600" b="0" i="0" u="none">
-                <a:solidFill>
-                  <a:srgbClr val="404040"/>
-                </a:solidFill>
-                <a:latin typeface="Trebuchet MS"/>
-                <a:ea typeface="Trebuchet MS"/>
-                <a:cs typeface="Trebuchet MS"/>
-                <a:sym typeface="Trebuchet MS"/>
-              </a:rPr>
-              <a:t>    &lt;tr&gt;</a:t>
-            </a:r>
-          </a:p>
-          <a:p>
-            <a:pPr marL="0" marR="0" lvl="0" indent="0" algn="l" rtl="0">
-              <a:lnSpc>
-                <a:spcPct val="80000"/>
-              </a:lnSpc>
-              <a:spcBef>
-                <a:spcPts val="400"/>
-              </a:spcBef>
-              <a:spcAft>
-                <a:spcPts val="0"/>
-              </a:spcAft>
-              <a:buNone/>
-            </a:pPr>
-            <a:r>
-              <a:rPr lang="en-US" sz="1600" b="0" i="0" u="none">
-                <a:solidFill>
-                  <a:srgbClr val="404040"/>
-                </a:solidFill>
-                <a:latin typeface="Trebuchet MS"/>
-                <a:ea typeface="Trebuchet MS"/>
-                <a:cs typeface="Trebuchet MS"/>
-                <a:sym typeface="Trebuchet MS"/>
-              </a:rPr>
-              <a:t>      &lt;td&gt;Colonne 1 ligne 1&lt;/td&gt;</a:t>
-            </a:r>
-          </a:p>
-          <a:p>
-            <a:pPr marL="0" marR="0" lvl="0" indent="0" algn="l" rtl="0">
-              <a:lnSpc>
-                <a:spcPct val="80000"/>
-              </a:lnSpc>
-              <a:spcBef>
-                <a:spcPts val="400"/>
-              </a:spcBef>
-              <a:spcAft>
-                <a:spcPts val="0"/>
-              </a:spcAft>
-              <a:buNone/>
-            </a:pPr>
-            <a:r>
-              <a:rPr lang="en-US" sz="1600" b="0" i="0" u="none">
-                <a:solidFill>
-                  <a:srgbClr val="404040"/>
-                </a:solidFill>
-                <a:latin typeface="Trebuchet MS"/>
-                <a:ea typeface="Trebuchet MS"/>
-                <a:cs typeface="Trebuchet MS"/>
-                <a:sym typeface="Trebuchet MS"/>
-              </a:rPr>
-              <a:t>      &lt;td&gt;Colonne 2 ligne 1&lt;/td&gt;</a:t>
-            </a:r>
-          </a:p>
-          <a:p>
-            <a:pPr marL="0" marR="0" lvl="0" indent="0" algn="l" rtl="0">
-              <a:lnSpc>
-                <a:spcPct val="80000"/>
-              </a:lnSpc>
-              <a:spcBef>
-                <a:spcPts val="400"/>
-              </a:spcBef>
-              <a:spcAft>
-                <a:spcPts val="0"/>
-              </a:spcAft>
-              <a:buNone/>
-            </a:pPr>
-            <a:r>
-              <a:rPr lang="en-US" sz="1600" b="0" i="0" u="none">
-                <a:solidFill>
-                  <a:srgbClr val="404040"/>
-                </a:solidFill>
-                <a:latin typeface="Trebuchet MS"/>
-                <a:ea typeface="Trebuchet MS"/>
-                <a:cs typeface="Trebuchet MS"/>
-                <a:sym typeface="Trebuchet MS"/>
-              </a:rPr>
-              <a:t>      &lt;td&gt;Colonne 3 ligne 1&lt;/td&gt;</a:t>
-            </a:r>
-          </a:p>
-          <a:p>
-            <a:pPr marL="0" marR="0" lvl="0" indent="0" algn="l" rtl="0">
-              <a:lnSpc>
-                <a:spcPct val="80000"/>
-              </a:lnSpc>
-              <a:spcBef>
-                <a:spcPts val="400"/>
-              </a:spcBef>
-              <a:spcAft>
-                <a:spcPts val="0"/>
-              </a:spcAft>
-              <a:buNone/>
-            </a:pPr>
-            <a:r>
-              <a:rPr lang="en-US" sz="1600" b="0" i="0" u="none">
-                <a:solidFill>
-                  <a:srgbClr val="404040"/>
-                </a:solidFill>
-                <a:latin typeface="Trebuchet MS"/>
-                <a:ea typeface="Trebuchet MS"/>
-                <a:cs typeface="Trebuchet MS"/>
-                <a:sym typeface="Trebuchet MS"/>
-              </a:rPr>
-              <a:t>    &lt;/tr&gt;</a:t>
-            </a:r>
-          </a:p>
-          <a:p>
-            <a:pPr marL="0" marR="0" lvl="0" indent="0" algn="l" rtl="0">
-              <a:lnSpc>
-                <a:spcPct val="80000"/>
-              </a:lnSpc>
-              <a:spcBef>
-                <a:spcPts val="400"/>
-              </a:spcBef>
-              <a:spcAft>
-                <a:spcPts val="0"/>
-              </a:spcAft>
-              <a:buNone/>
-            </a:pPr>
-            <a:r>
-              <a:rPr lang="en-US" sz="1600" b="0" i="0" u="none">
-                <a:solidFill>
-                  <a:srgbClr val="404040"/>
-                </a:solidFill>
-                <a:latin typeface="Trebuchet MS"/>
-                <a:ea typeface="Trebuchet MS"/>
-                <a:cs typeface="Trebuchet MS"/>
-                <a:sym typeface="Trebuchet MS"/>
-              </a:rPr>
-              <a:t>    &lt;tr&gt;</a:t>
-            </a:r>
-          </a:p>
-          <a:p>
-            <a:pPr marL="0" marR="0" lvl="0" indent="0" algn="l" rtl="0">
-              <a:lnSpc>
-                <a:spcPct val="80000"/>
-              </a:lnSpc>
-              <a:spcBef>
-                <a:spcPts val="400"/>
-              </a:spcBef>
-              <a:spcAft>
-                <a:spcPts val="0"/>
-              </a:spcAft>
-              <a:buNone/>
-            </a:pPr>
-            <a:r>
-              <a:rPr lang="en-US" sz="1600" b="0" i="0" u="none">
-                <a:solidFill>
-                  <a:srgbClr val="404040"/>
-                </a:solidFill>
-                <a:latin typeface="Trebuchet MS"/>
-                <a:ea typeface="Trebuchet MS"/>
-                <a:cs typeface="Trebuchet MS"/>
-                <a:sym typeface="Trebuchet MS"/>
-              </a:rPr>
-              <a:t>      &lt;td&gt;Colonne 1 ligne 2&lt;/td&gt;</a:t>
-            </a:r>
-          </a:p>
-          <a:p>
-            <a:pPr marL="0" marR="0" lvl="0" indent="0" algn="l" rtl="0">
-              <a:lnSpc>
-                <a:spcPct val="80000"/>
-              </a:lnSpc>
-              <a:spcBef>
-                <a:spcPts val="400"/>
-              </a:spcBef>
-              <a:spcAft>
-                <a:spcPts val="0"/>
-              </a:spcAft>
-              <a:buNone/>
-            </a:pPr>
-            <a:r>
-              <a:rPr lang="en-US" sz="1600" b="0" i="0" u="none">
-                <a:solidFill>
-                  <a:srgbClr val="404040"/>
-                </a:solidFill>
-                <a:latin typeface="Trebuchet MS"/>
-                <a:ea typeface="Trebuchet MS"/>
-                <a:cs typeface="Trebuchet MS"/>
-                <a:sym typeface="Trebuchet MS"/>
-              </a:rPr>
-              <a:t>      &lt;td&gt;&lt;/td&gt;</a:t>
-            </a:r>
-          </a:p>
-          <a:p>
-            <a:pPr marL="0" marR="0" lvl="0" indent="0" algn="l" rtl="0">
-              <a:lnSpc>
-                <a:spcPct val="80000"/>
-              </a:lnSpc>
-              <a:spcBef>
-                <a:spcPts val="400"/>
-              </a:spcBef>
-              <a:spcAft>
-                <a:spcPts val="0"/>
-              </a:spcAft>
-              <a:buNone/>
-            </a:pPr>
-            <a:r>
-              <a:rPr lang="en-US" sz="1600" b="0" i="0" u="none">
-                <a:solidFill>
-                  <a:srgbClr val="404040"/>
-                </a:solidFill>
-                <a:latin typeface="Trebuchet MS"/>
-                <a:ea typeface="Trebuchet MS"/>
-                <a:cs typeface="Trebuchet MS"/>
-                <a:sym typeface="Trebuchet MS"/>
-              </a:rPr>
-              <a:t>      &lt;td&gt;&lt;/td&gt;</a:t>
-            </a:r>
-          </a:p>
-          <a:p>
-            <a:pPr marL="0" marR="0" lvl="0" indent="0" algn="l" rtl="0">
-              <a:lnSpc>
-                <a:spcPct val="80000"/>
-              </a:lnSpc>
-              <a:spcBef>
-                <a:spcPts val="400"/>
-              </a:spcBef>
-              <a:spcAft>
-                <a:spcPts val="0"/>
-              </a:spcAft>
-              <a:buNone/>
-            </a:pPr>
-            <a:r>
-              <a:rPr lang="en-US" sz="1600" b="0" i="0" u="none">
-                <a:solidFill>
-                  <a:srgbClr val="404040"/>
-                </a:solidFill>
-                <a:latin typeface="Trebuchet MS"/>
-                <a:ea typeface="Trebuchet MS"/>
-                <a:cs typeface="Trebuchet MS"/>
-                <a:sym typeface="Trebuchet MS"/>
-              </a:rPr>
-              <a:t>    &lt;/tr&gt;</a:t>
-            </a:r>
-          </a:p>
-          <a:p>
-            <a:pPr marL="0" marR="0" lvl="0" indent="0" algn="l" rtl="0">
-              <a:lnSpc>
-                <a:spcPct val="80000"/>
-              </a:lnSpc>
-              <a:spcBef>
-                <a:spcPts val="400"/>
-              </a:spcBef>
-              <a:spcAft>
-                <a:spcPts val="0"/>
-              </a:spcAft>
-              <a:buNone/>
-            </a:pPr>
-            <a:r>
-              <a:rPr lang="en-US" sz="1600" b="0" i="0" u="none">
-                <a:solidFill>
-                  <a:srgbClr val="404040"/>
-                </a:solidFill>
-                <a:latin typeface="Trebuchet MS"/>
-                <a:ea typeface="Trebuchet MS"/>
-                <a:cs typeface="Trebuchet MS"/>
-                <a:sym typeface="Trebuchet MS"/>
-              </a:rPr>
-              <a:t>    &lt;tr&gt;</a:t>
-            </a:r>
-          </a:p>
-          <a:p>
-            <a:pPr marL="0" marR="0" lvl="0" indent="0" algn="l" rtl="0">
-              <a:lnSpc>
-                <a:spcPct val="80000"/>
-              </a:lnSpc>
-              <a:spcBef>
-                <a:spcPts val="400"/>
-              </a:spcBef>
-              <a:spcAft>
-                <a:spcPts val="0"/>
-              </a:spcAft>
-              <a:buNone/>
-            </a:pPr>
-            <a:r>
-              <a:rPr lang="en-US" sz="1600" b="0" i="0" u="none">
-                <a:solidFill>
-                  <a:srgbClr val="404040"/>
-                </a:solidFill>
-                <a:latin typeface="Trebuchet MS"/>
-                <a:ea typeface="Trebuchet MS"/>
-                <a:cs typeface="Trebuchet MS"/>
-                <a:sym typeface="Trebuchet MS"/>
-              </a:rPr>
-              <a:t>      &lt;td&gt;Colonne 1 ligne 3&lt;/td&gt;</a:t>
-            </a:r>
-          </a:p>
-          <a:p>
-            <a:pPr marL="0" marR="0" lvl="0" indent="0" algn="l" rtl="0">
-              <a:lnSpc>
-                <a:spcPct val="80000"/>
-              </a:lnSpc>
-              <a:spcBef>
-                <a:spcPts val="400"/>
-              </a:spcBef>
-              <a:spcAft>
-                <a:spcPts val="0"/>
-              </a:spcAft>
-              <a:buNone/>
-            </a:pPr>
-            <a:r>
-              <a:rPr lang="en-US" sz="1600" b="0" i="0" u="none">
-                <a:solidFill>
-                  <a:srgbClr val="404040"/>
-                </a:solidFill>
-                <a:latin typeface="Trebuchet MS"/>
-                <a:ea typeface="Trebuchet MS"/>
-                <a:cs typeface="Trebuchet MS"/>
-                <a:sym typeface="Trebuchet MS"/>
-              </a:rPr>
-              <a:t>      &lt;td&gt;&lt;/td&gt;</a:t>
-            </a:r>
-          </a:p>
-          <a:p>
-            <a:pPr marL="0" marR="0" lvl="0" indent="0" algn="l" rtl="0">
-              <a:lnSpc>
-                <a:spcPct val="80000"/>
-              </a:lnSpc>
-              <a:spcBef>
-                <a:spcPts val="400"/>
-              </a:spcBef>
-              <a:spcAft>
-                <a:spcPts val="0"/>
-              </a:spcAft>
-              <a:buNone/>
-            </a:pPr>
-            <a:r>
-              <a:rPr lang="en-US" sz="1600" b="0" i="0" u="none">
-                <a:solidFill>
-                  <a:srgbClr val="404040"/>
-                </a:solidFill>
-                <a:latin typeface="Trebuchet MS"/>
-                <a:ea typeface="Trebuchet MS"/>
-                <a:cs typeface="Trebuchet MS"/>
-                <a:sym typeface="Trebuchet MS"/>
-              </a:rPr>
-              <a:t>      &lt;td&gt;&lt;/td&gt;</a:t>
-            </a:r>
-          </a:p>
-          <a:p>
-            <a:pPr marL="0" marR="0" lvl="0" indent="0" algn="l" rtl="0">
-              <a:lnSpc>
-                <a:spcPct val="80000"/>
-              </a:lnSpc>
-              <a:spcBef>
-                <a:spcPts val="400"/>
-              </a:spcBef>
-              <a:spcAft>
-                <a:spcPts val="0"/>
-              </a:spcAft>
-              <a:buNone/>
-            </a:pPr>
-            <a:r>
-              <a:rPr lang="en-US" sz="1600" b="0" i="0" u="none">
-                <a:solidFill>
-                  <a:srgbClr val="404040"/>
-                </a:solidFill>
-                <a:latin typeface="Trebuchet MS"/>
-                <a:ea typeface="Trebuchet MS"/>
-                <a:cs typeface="Trebuchet MS"/>
-                <a:sym typeface="Trebuchet MS"/>
-              </a:rPr>
-              <a:t>    &lt;/tr&gt;</a:t>
-            </a:r>
-          </a:p>
-          <a:p>
-            <a:pPr marL="0" marR="0" lvl="0" indent="0" algn="l" rtl="0">
-              <a:lnSpc>
-                <a:spcPct val="80000"/>
-              </a:lnSpc>
-              <a:spcBef>
-                <a:spcPts val="400"/>
-              </a:spcBef>
-              <a:spcAft>
-                <a:spcPts val="0"/>
-              </a:spcAft>
-              <a:buNone/>
-            </a:pPr>
-            <a:r>
-              <a:rPr lang="en-US" sz="1600" b="0" i="0" u="none">
-                <a:solidFill>
-                  <a:srgbClr val="404040"/>
-                </a:solidFill>
-                <a:latin typeface="Trebuchet MS"/>
-                <a:ea typeface="Trebuchet MS"/>
-                <a:cs typeface="Trebuchet MS"/>
-                <a:sym typeface="Trebuchet MS"/>
-              </a:rPr>
-              <a:t> &lt;/table&gt;</a:t>
-            </a:r>
-          </a:p>
-          <a:p>
-            <a:pPr marL="0" marR="0" lvl="0" indent="0" algn="l" rtl="0">
-              <a:spcBef>
-                <a:spcPts val="1000"/>
-              </a:spcBef>
-              <a:spcAft>
-                <a:spcPts val="0"/>
-              </a:spcAft>
-              <a:buNone/>
-            </a:pPr>
-            <a:endParaRPr sz="1600" b="0" i="0" u="none">
-              <a:solidFill>
-                <a:srgbClr val="404040"/>
-              </a:solidFill>
-              <a:latin typeface="Trebuchet MS"/>
-              <a:ea typeface="Trebuchet MS"/>
-              <a:cs typeface="Trebuchet MS"/>
-              <a:sym typeface="Trebuchet MS"/>
-            </a:endParaRPr>
-          </a:p>
-        </p:txBody>
-      </p:sp>
-      <p:pic>
-        <p:nvPicPr>
-          <p:cNvPr id="398" name="Shape 398"/>
-          <p:cNvPicPr preferRelativeResize="0"/>
-          <p:nvPr/>
-        </p:nvPicPr>
-        <p:blipFill rotWithShape="1">
-          <a:blip r:embed="rId3">
-            <a:alphaModFix/>
-          </a:blip>
-          <a:srcRect l="21874" t="21665" r="51249" b="69166"/>
-          <a:stretch/>
-        </p:blipFill>
-        <p:spPr>
-          <a:xfrm>
-            <a:off x="4067175" y="4652962"/>
-            <a:ext cx="4373562" cy="1119187"/>
-          </a:xfrm>
-          <a:prstGeom prst="rect">
-            <a:avLst/>
-          </a:prstGeom>
-          <a:noFill/>
-          <a:ln>
-            <a:noFill/>
-          </a:ln>
-        </p:spPr>
-      </p:pic>
     </p:spTree>
   </p:cSld>
   <p:clrMapOvr>
@@ -41013,85 +41449,26 @@
           </a:bodyPr>
           <a:lstStyle/>
           <a:p>
-            <a:pPr marL="342900" marR="0" lvl="0" indent="-342900" algn="l" rtl="0">
-              <a:lnSpc>
-                <a:spcPct val="100000"/>
-              </a:lnSpc>
-              <a:spcBef>
-                <a:spcPts val="0"/>
-              </a:spcBef>
-              <a:spcAft>
-                <a:spcPts val="0"/>
-              </a:spcAft>
-              <a:buClr>
-                <a:schemeClr val="accent1"/>
-              </a:buClr>
-              <a:buSzPct val="79999"/>
-              <a:buFont typeface="Noto Sans Symbols"/>
-              <a:buChar char="▶"/>
-            </a:pPr>
+            <a:pPr lvl="0" indent="-342900"/>
             <a:r>
-              <a:rPr lang="en-US" sz="1800" b="0" i="0" u="sng">
+              <a:rPr lang="en-US" u="sng" dirty="0" smtClean="0">
                 <a:solidFill>
                   <a:schemeClr val="hlink"/>
                 </a:solidFill>
-                <a:latin typeface="Trebuchet MS"/>
-                <a:ea typeface="Trebuchet MS"/>
-                <a:cs typeface="Trebuchet MS"/>
-                <a:sym typeface="Trebuchet MS"/>
                 <a:hlinkClick r:id="rId3"/>
               </a:rPr>
-              <a:t>signification-des-prenoms.com</a:t>
+              <a:t>http</a:t>
             </a:r>
-          </a:p>
-          <a:p>
-            <a:pPr marL="342900" marR="0" lvl="0" indent="-342900" algn="l" rtl="0">
-              <a:lnSpc>
-                <a:spcPct val="100000"/>
-              </a:lnSpc>
-              <a:spcBef>
-                <a:spcPts val="1000"/>
-              </a:spcBef>
-              <a:spcAft>
-                <a:spcPts val="0"/>
-              </a:spcAft>
-              <a:buClr>
-                <a:schemeClr val="accent1"/>
-              </a:buClr>
-              <a:buSzPct val="79999"/>
-              <a:buFont typeface="Noto Sans Symbols"/>
-              <a:buChar char="▶"/>
-            </a:pPr>
             <a:r>
-              <a:rPr lang="en-US" sz="1800" b="0" i="0" u="sng">
+              <a:rPr lang="en-US" u="sng" dirty="0">
                 <a:solidFill>
                   <a:schemeClr val="hlink"/>
                 </a:solidFill>
-                <a:latin typeface="Trebuchet MS"/>
-                <a:ea typeface="Trebuchet MS"/>
-                <a:cs typeface="Trebuchet MS"/>
-                <a:sym typeface="Trebuchet MS"/>
-                <a:hlinkClick r:id="rId4"/>
+                <a:hlinkClick r:id="rId3"/>
               </a:rPr>
-              <a:t>wikipedia.org</a:t>
+              <a:t>://www.w3schools.com/html/html_tables.asp</a:t>
             </a:r>
-          </a:p>
-          <a:p>
-            <a:pPr marL="342900" marR="0" lvl="0" indent="-342900" algn="l" rtl="0">
-              <a:spcBef>
-                <a:spcPts val="1000"/>
-              </a:spcBef>
-              <a:spcAft>
-                <a:spcPts val="0"/>
-              </a:spcAft>
-              <a:buClr>
-                <a:schemeClr val="accent1"/>
-              </a:buClr>
-              <a:buSzPct val="79999"/>
-              <a:buFont typeface="Noto Sans Symbols"/>
-              <a:buNone/>
-            </a:pPr>
-            <a:endParaRPr sz="1800" b="0" i="0" u="sng">
+            <a:endParaRPr lang="en-US" sz="1800" b="0" i="0" u="sng" dirty="0">
               <a:solidFill>
                 <a:schemeClr val="hlink"/>
               </a:solidFill>
@@ -41099,7 +41476,33 @@
               <a:ea typeface="Trebuchet MS"/>
               <a:cs typeface="Trebuchet MS"/>
               <a:sym typeface="Trebuchet MS"/>
-              <a:hlinkClick r:id="rId4"/>
+              <a:hlinkClick r:id="rId3"/>
+            </a:endParaRPr>
+          </a:p>
+          <a:p>
+            <a:pPr marL="342900" marR="0" lvl="0" indent="-342900" algn="l" rtl="0">
+              <a:spcBef>
+                <a:spcPts val="1000"/>
+              </a:spcBef>
+              <a:spcAft>
+                <a:spcPts val="0"/>
+              </a:spcAft>
+              <a:buClr>
+                <a:schemeClr val="accent1"/>
+              </a:buClr>
+              <a:buSzPct val="79999"/>
+              <a:buFont typeface="Noto Sans Symbols"/>
+              <a:buNone/>
+            </a:pPr>
+            <a:endParaRPr sz="1800" b="0" i="0" u="sng" dirty="0">
+              <a:solidFill>
+                <a:schemeClr val="hlink"/>
+              </a:solidFill>
+              <a:latin typeface="Trebuchet MS"/>
+              <a:ea typeface="Trebuchet MS"/>
+              <a:cs typeface="Trebuchet MS"/>
+              <a:sym typeface="Trebuchet MS"/>
+              <a:hlinkClick r:id="rId3"/>
             </a:endParaRPr>
           </a:p>
         </p:txBody>
@@ -42183,7 +42586,7 @@
               <a:buFont typeface="Trebuchet MS"/>
             </a:pPr>
             <a:r>
-              <a:rPr lang="en-US" sz="1800" b="0" i="0" u="none">
+              <a:rPr lang="en-US" sz="1800" b="0" i="0" u="none" dirty="0" err="1">
                 <a:solidFill>
                   <a:srgbClr val="404040"/>
                 </a:solidFill>
@@ -42192,7 +42595,259 @@
                 <a:cs typeface="Trebuchet MS"/>
                 <a:sym typeface="Trebuchet MS"/>
               </a:rPr>
-              <a:t>Assurez-vous que l’encodage affiché par votre navigateur est le même que celui déclaré. </a:t>
+              <a:t>Assurez-vous</a:t>
+            </a:r>
+            <a:r>
+              <a:rPr lang="en-US" sz="1800" b="0" i="0" u="none" dirty="0">
+                <a:solidFill>
+                  <a:srgbClr val="404040"/>
+                </a:solidFill>
+                <a:latin typeface="Trebuchet MS"/>
+                <a:ea typeface="Trebuchet MS"/>
+                <a:cs typeface="Trebuchet MS"/>
+                <a:sym typeface="Trebuchet MS"/>
+              </a:rPr>
+              <a:t> </a:t>
+            </a:r>
+            <a:r>
+              <a:rPr lang="en-US" sz="1800" b="0" i="0" u="none" dirty="0" err="1">
+                <a:solidFill>
+                  <a:srgbClr val="404040"/>
+                </a:solidFill>
+                <a:latin typeface="Trebuchet MS"/>
+                <a:ea typeface="Trebuchet MS"/>
+                <a:cs typeface="Trebuchet MS"/>
+                <a:sym typeface="Trebuchet MS"/>
+              </a:rPr>
+              <a:t>que</a:t>
+            </a:r>
+            <a:r>
+              <a:rPr lang="en-US" sz="1800" b="0" i="0" u="none" dirty="0">
+                <a:solidFill>
+                  <a:srgbClr val="404040"/>
+                </a:solidFill>
+                <a:latin typeface="Trebuchet MS"/>
+                <a:ea typeface="Trebuchet MS"/>
+                <a:cs typeface="Trebuchet MS"/>
+                <a:sym typeface="Trebuchet MS"/>
+              </a:rPr>
+              <a:t> </a:t>
+            </a:r>
+            <a:r>
+              <a:rPr lang="en-US" sz="1800" b="0" i="0" u="none" dirty="0" err="1">
+                <a:solidFill>
+                  <a:srgbClr val="404040"/>
+                </a:solidFill>
+                <a:latin typeface="Trebuchet MS"/>
+                <a:ea typeface="Trebuchet MS"/>
+                <a:cs typeface="Trebuchet MS"/>
+                <a:sym typeface="Trebuchet MS"/>
+              </a:rPr>
+              <a:t>l’encodage</a:t>
+            </a:r>
+            <a:r>
+              <a:rPr lang="en-US" sz="1800" b="0" i="0" u="none" dirty="0">
+                <a:solidFill>
+                  <a:srgbClr val="404040"/>
+                </a:solidFill>
+                <a:latin typeface="Trebuchet MS"/>
+                <a:ea typeface="Trebuchet MS"/>
+                <a:cs typeface="Trebuchet MS"/>
+                <a:sym typeface="Trebuchet MS"/>
+              </a:rPr>
+              <a:t> </a:t>
+            </a:r>
+            <a:r>
+              <a:rPr lang="en-US" sz="1800" b="0" i="0" u="none" dirty="0" err="1">
+                <a:solidFill>
+                  <a:srgbClr val="404040"/>
+                </a:solidFill>
+                <a:latin typeface="Trebuchet MS"/>
+                <a:ea typeface="Trebuchet MS"/>
+                <a:cs typeface="Trebuchet MS"/>
+                <a:sym typeface="Trebuchet MS"/>
+              </a:rPr>
+              <a:t>affiché</a:t>
+            </a:r>
+            <a:r>
+              <a:rPr lang="en-US" sz="1800" b="0" i="0" u="none" dirty="0">
+                <a:solidFill>
+                  <a:srgbClr val="404040"/>
+                </a:solidFill>
+                <a:latin typeface="Trebuchet MS"/>
+                <a:ea typeface="Trebuchet MS"/>
+                <a:cs typeface="Trebuchet MS"/>
+                <a:sym typeface="Trebuchet MS"/>
+              </a:rPr>
+              <a:t> par </a:t>
+            </a:r>
+            <a:r>
+              <a:rPr lang="en-US" sz="1800" b="0" i="0" u="none" dirty="0" err="1">
+                <a:solidFill>
+                  <a:srgbClr val="404040"/>
+                </a:solidFill>
+                <a:latin typeface="Trebuchet MS"/>
+                <a:ea typeface="Trebuchet MS"/>
+                <a:cs typeface="Trebuchet MS"/>
+                <a:sym typeface="Trebuchet MS"/>
+              </a:rPr>
+              <a:t>votre</a:t>
+            </a:r>
+            <a:r>
+              <a:rPr lang="en-US" sz="1800" b="0" i="0" u="none" dirty="0">
+                <a:solidFill>
+                  <a:srgbClr val="404040"/>
+                </a:solidFill>
+                <a:latin typeface="Trebuchet MS"/>
+                <a:ea typeface="Trebuchet MS"/>
+                <a:cs typeface="Trebuchet MS"/>
+                <a:sym typeface="Trebuchet MS"/>
+              </a:rPr>
+              <a:t> </a:t>
+            </a:r>
+            <a:r>
+              <a:rPr lang="en-US" sz="1800" b="0" i="0" u="none" dirty="0" err="1">
+                <a:solidFill>
+                  <a:srgbClr val="404040"/>
+                </a:solidFill>
+                <a:latin typeface="Trebuchet MS"/>
+                <a:ea typeface="Trebuchet MS"/>
+                <a:cs typeface="Trebuchet MS"/>
+                <a:sym typeface="Trebuchet MS"/>
+              </a:rPr>
+              <a:t>navigateur</a:t>
+            </a:r>
+            <a:r>
+              <a:rPr lang="en-US" sz="1800" b="0" i="0" u="none" dirty="0">
+                <a:solidFill>
+                  <a:srgbClr val="404040"/>
+                </a:solidFill>
+                <a:latin typeface="Trebuchet MS"/>
+                <a:ea typeface="Trebuchet MS"/>
+                <a:cs typeface="Trebuchet MS"/>
+                <a:sym typeface="Trebuchet MS"/>
+              </a:rPr>
+              <a:t> </a:t>
+            </a:r>
+            <a:r>
+              <a:rPr lang="en-US" sz="1800" b="0" i="0" u="none" dirty="0" err="1">
+                <a:solidFill>
+                  <a:srgbClr val="404040"/>
+                </a:solidFill>
+                <a:latin typeface="Trebuchet MS"/>
+                <a:ea typeface="Trebuchet MS"/>
+                <a:cs typeface="Trebuchet MS"/>
+                <a:sym typeface="Trebuchet MS"/>
+              </a:rPr>
+              <a:t>est</a:t>
+            </a:r>
+            <a:r>
+              <a:rPr lang="en-US" sz="1800" b="0" i="0" u="none" dirty="0">
+                <a:solidFill>
+                  <a:srgbClr val="404040"/>
+                </a:solidFill>
+                <a:latin typeface="Trebuchet MS"/>
+                <a:ea typeface="Trebuchet MS"/>
+                <a:cs typeface="Trebuchet MS"/>
+                <a:sym typeface="Trebuchet MS"/>
+              </a:rPr>
+              <a:t> le </a:t>
+            </a:r>
+            <a:r>
+              <a:rPr lang="en-US" sz="1800" b="0" i="0" u="none" dirty="0" err="1">
+                <a:solidFill>
+                  <a:srgbClr val="404040"/>
+                </a:solidFill>
+                <a:latin typeface="Trebuchet MS"/>
+                <a:ea typeface="Trebuchet MS"/>
+                <a:cs typeface="Trebuchet MS"/>
+                <a:sym typeface="Trebuchet MS"/>
+              </a:rPr>
+              <a:t>même</a:t>
+            </a:r>
+            <a:r>
+              <a:rPr lang="en-US" sz="1800" b="0" i="0" u="none" dirty="0">
+                <a:solidFill>
+                  <a:srgbClr val="404040"/>
+                </a:solidFill>
+                <a:latin typeface="Trebuchet MS"/>
+                <a:ea typeface="Trebuchet MS"/>
+                <a:cs typeface="Trebuchet MS"/>
+                <a:sym typeface="Trebuchet MS"/>
+              </a:rPr>
+              <a:t> </a:t>
+            </a:r>
+            <a:r>
+              <a:rPr lang="en-US" sz="1800" b="0" i="0" u="none" dirty="0" err="1">
+                <a:solidFill>
+                  <a:srgbClr val="404040"/>
+                </a:solidFill>
+                <a:latin typeface="Trebuchet MS"/>
+                <a:ea typeface="Trebuchet MS"/>
+                <a:cs typeface="Trebuchet MS"/>
+                <a:sym typeface="Trebuchet MS"/>
+              </a:rPr>
+              <a:t>que</a:t>
+            </a:r>
+            <a:r>
+              <a:rPr lang="en-US" sz="1800" b="0" i="0" u="none" dirty="0">
+                <a:solidFill>
+                  <a:srgbClr val="404040"/>
+                </a:solidFill>
+                <a:latin typeface="Trebuchet MS"/>
+                <a:ea typeface="Trebuchet MS"/>
+                <a:cs typeface="Trebuchet MS"/>
+                <a:sym typeface="Trebuchet MS"/>
+              </a:rPr>
+              <a:t> </a:t>
+            </a:r>
+            <a:r>
+              <a:rPr lang="en-US" sz="1800" b="0" i="0" u="none" dirty="0" err="1">
+                <a:solidFill>
+                  <a:srgbClr val="404040"/>
+                </a:solidFill>
+                <a:latin typeface="Trebuchet MS"/>
+                <a:ea typeface="Trebuchet MS"/>
+                <a:cs typeface="Trebuchet MS"/>
+                <a:sym typeface="Trebuchet MS"/>
+              </a:rPr>
+              <a:t>celui</a:t>
+            </a:r>
+            <a:r>
+              <a:rPr lang="en-US" sz="1800" b="0" i="0" u="none" dirty="0">
+                <a:solidFill>
+                  <a:srgbClr val="404040"/>
+                </a:solidFill>
+                <a:latin typeface="Trebuchet MS"/>
+                <a:ea typeface="Trebuchet MS"/>
+                <a:cs typeface="Trebuchet MS"/>
+                <a:sym typeface="Trebuchet MS"/>
+              </a:rPr>
+              <a:t> </a:t>
+            </a:r>
+            <a:r>
+              <a:rPr lang="en-US" sz="1800" b="0" i="0" u="none" dirty="0" err="1">
+                <a:solidFill>
+                  <a:srgbClr val="404040"/>
+                </a:solidFill>
+                <a:latin typeface="Trebuchet MS"/>
+                <a:ea typeface="Trebuchet MS"/>
+                <a:cs typeface="Trebuchet MS"/>
+                <a:sym typeface="Trebuchet MS"/>
+              </a:rPr>
+              <a:t>déclaré</a:t>
+            </a:r>
+            <a:r>
+              <a:rPr lang="en-US" sz="1800" b="0" i="0" u="none" dirty="0">
+                <a:solidFill>
+                  <a:srgbClr val="404040"/>
+                </a:solidFill>
+                <a:latin typeface="Trebuchet MS"/>
+                <a:ea typeface="Trebuchet MS"/>
+                <a:cs typeface="Trebuchet MS"/>
+                <a:sym typeface="Trebuchet MS"/>
+              </a:rPr>
+              <a:t>. </a:t>
             </a:r>
           </a:p>
           <a:p>
@@ -42213,7 +42868,7 @@
               <a:buFont typeface="Trebuchet MS"/>
             </a:pPr>
             <a:r>
-              <a:rPr lang="en-US" sz="1800" b="0" i="0" u="none">
+              <a:rPr lang="en-US" sz="1800" b="0" i="0" u="none" dirty="0" smtClean="0">
                 <a:solidFill>
                   <a:srgbClr val="404040"/>
                 </a:solidFill>
@@ -42222,53 +42877,69 @@
                 <a:cs typeface="Trebuchet MS"/>
                 <a:sym typeface="Trebuchet MS"/>
               </a:rPr>
-              <a:t>D’autres choses peuvent interférer avec l’encodage déclaré. </a:t>
-            </a:r>
-          </a:p>
-          <a:p>
-            <a:pPr marL="457200" marR="0" lvl="0" indent="-342900" algn="l" rtl="0">
-              <a:lnSpc>
-                <a:spcPct val="100000"/>
-              </a:lnSpc>
-              <a:spcBef>
-                <a:spcPts val="1000"/>
-              </a:spcBef>
-              <a:spcAft>
-                <a:spcPts val="0"/>
-              </a:spcAft>
-              <a:buClr>
-                <a:srgbClr val="404040"/>
-              </a:buClr>
-              <a:buSzPct val="100000"/>
-              <a:buFont typeface="Trebuchet MS"/>
-            </a:pPr>
-            <a:r>
-              <a:rPr lang="en-US" sz="1800" b="0" i="0" u="none">
-                <a:solidFill>
-                  <a:srgbClr val="404040"/>
-                </a:solidFill>
-                <a:latin typeface="Trebuchet MS"/>
-                <a:ea typeface="Trebuchet MS"/>
-                <a:cs typeface="Trebuchet MS"/>
-                <a:sym typeface="Trebuchet MS"/>
-              </a:rPr>
-              <a:t>Pour en savoir plus, voir </a:t>
+              <a:t>Pour </a:t>
             </a:r>
             <a:r>
-              <a:rPr lang="en-US" sz="1800" b="0" i="0" u="sng">
-                <a:solidFill>
-                  <a:schemeClr val="hlink"/>
-                </a:solidFill>
-                <a:latin typeface="Trebuchet MS"/>
-                <a:ea typeface="Trebuchet MS"/>
-                <a:cs typeface="Trebuchet MS"/>
-                <a:sym typeface="Trebuchet MS"/>
-                <a:hlinkClick r:id="rId3"/>
+              <a:rPr lang="en-US" sz="1800" b="0" i="0" u="none" dirty="0">
+                <a:solidFill>
+                  <a:srgbClr val="404040"/>
+                </a:solidFill>
+                <a:latin typeface="Trebuchet MS"/>
+                <a:ea typeface="Trebuchet MS"/>
+                <a:cs typeface="Trebuchet MS"/>
+                <a:sym typeface="Trebuchet MS"/>
               </a:rPr>
-              <a:t>h</a:t>
+              <a:t>en savoir plus, </a:t>
             </a:r>
             <a:r>
-              <a:rPr lang="en-US" sz="1800" b="0" i="0" u="sng">
+              <a:rPr lang="en-US" sz="1800" b="0" i="0" u="none" dirty="0" err="1" smtClean="0">
+                <a:solidFill>
+                  <a:srgbClr val="404040"/>
+                </a:solidFill>
+                <a:latin typeface="Trebuchet MS"/>
+                <a:ea typeface="Trebuchet MS"/>
+                <a:cs typeface="Trebuchet MS"/>
+                <a:sym typeface="Trebuchet MS"/>
+              </a:rPr>
+              <a:t>voir</a:t>
+            </a:r>
+            <a:r>
+              <a:rPr lang="en-US" sz="1800" b="0" i="0" u="none" dirty="0" smtClean="0">
+                <a:solidFill>
+                  <a:srgbClr val="404040"/>
+                </a:solidFill>
+                <a:latin typeface="Trebuchet MS"/>
+                <a:ea typeface="Trebuchet MS"/>
+                <a:cs typeface="Trebuchet MS"/>
+                <a:sym typeface="Trebuchet MS"/>
+              </a:rPr>
+              <a:t/>
+            </a:r>
+            <a:br>
+              <a:rPr lang="en-US" sz="1800" b="0" i="0" u="none" dirty="0" smtClean="0">
+                <a:solidFill>
+                  <a:srgbClr val="404040"/>
+                </a:solidFill>
+                <a:latin typeface="Trebuchet MS"/>
+                <a:ea typeface="Trebuchet MS"/>
+                <a:cs typeface="Trebuchet MS"/>
+                <a:sym typeface="Trebuchet MS"/>
+              </a:rPr>
+            </a:br>
+            <a:r>
+              <a:rPr lang="en-US" sz="1800" b="0" i="0" u="none" dirty="0" smtClean="0">
+                <a:solidFill>
+                  <a:srgbClr val="404040"/>
+                </a:solidFill>
+                <a:latin typeface="Trebuchet MS"/>
+                <a:ea typeface="Trebuchet MS"/>
+                <a:cs typeface="Trebuchet MS"/>
+                <a:sym typeface="Trebuchet MS"/>
+              </a:rPr>
+              <a:t> </a:t>
+            </a:r>
+            <a:r>
+              <a:rPr lang="en-US" sz="1800" b="0" i="0" u="sng" dirty="0">
                 <a:solidFill>
                   <a:schemeClr val="hlink"/>
                 </a:solidFill>
@@ -42276,25 +42947,30 @@
                 <a:ea typeface="Trebuchet MS"/>
                 <a:cs typeface="Trebuchet MS"/>
                 <a:sym typeface="Trebuchet MS"/>
-                <a:hlinkClick r:id="rId3"/>
               </a:rPr>
-              <a:t>tmlpurifier.org/docs/enduser-utf8.html</a:t>
+              <a:t>htmlpurifier.org/docs/enduser-utf8.</a:t>
             </a:r>
-          </a:p>
-          <a:p>
-            <a:pPr marL="0" marR="0" lvl="0" indent="0" algn="l" rtl="0">
-              <a:lnSpc>
-                <a:spcPct val="100000"/>
-              </a:lnSpc>
-              <a:spcBef>
-                <a:spcPts val="1000"/>
-              </a:spcBef>
-              <a:spcAft>
-                <a:spcPts val="0"/>
-              </a:spcAft>
-              <a:buNone/>
-            </a:pPr>
-            <a:endParaRPr/>
+            <a:r>
+              <a:rPr lang="en-US" sz="1800" b="0" i="0" u="sng" dirty="0" smtClean="0">
+                <a:solidFill>
+                  <a:schemeClr val="hlink"/>
+                </a:solidFill>
+                <a:latin typeface="Trebuchet MS"/>
+                <a:ea typeface="Trebuchet MS"/>
+                <a:cs typeface="Trebuchet MS"/>
+                <a:sym typeface="Trebuchet MS"/>
+              </a:rPr>
+              <a:t>html</a:t>
+            </a:r>
+            <a:endParaRPr lang="en-US" sz="1800" b="0" i="0" u="sng" dirty="0">
+              <a:solidFill>
+                <a:schemeClr val="hlink"/>
+              </a:solidFill>
+              <a:latin typeface="Trebuchet MS"/>
+              <a:ea typeface="Trebuchet MS"/>
+              <a:cs typeface="Trebuchet MS"/>
+              <a:sym typeface="Trebuchet MS"/>
+            </a:endParaRPr>
           </a:p>
         </p:txBody>
       </p:sp>

</xml_diff>